<commit_message>
Added 5th linux adm lecture
</commit_message>
<xml_diff>
--- a/LinuxAdm/LinuxAdm5.pptx
+++ b/LinuxAdm/LinuxAdm5.pptx
@@ -7,7 +7,19 @@
   <p:sldIdLst>
     <p:sldId id="256" r:id="rId2"/>
     <p:sldId id="384" r:id="rId3"/>
-    <p:sldId id="385" r:id="rId4"/>
+    <p:sldId id="386" r:id="rId4"/>
+    <p:sldId id="387" r:id="rId5"/>
+    <p:sldId id="388" r:id="rId6"/>
+    <p:sldId id="389" r:id="rId7"/>
+    <p:sldId id="390" r:id="rId8"/>
+    <p:sldId id="396" r:id="rId9"/>
+    <p:sldId id="391" r:id="rId10"/>
+    <p:sldId id="393" r:id="rId11"/>
+    <p:sldId id="392" r:id="rId12"/>
+    <p:sldId id="397" r:id="rId13"/>
+    <p:sldId id="395" r:id="rId14"/>
+    <p:sldId id="385" r:id="rId15"/>
+    <p:sldId id="394" r:id="rId16"/>
   </p:sldIdLst>
   <p:sldSz cx="12192000" cy="6858000"/>
   <p:notesSz cx="6858000" cy="9144000"/>
@@ -263,7 +275,7 @@
           <a:p>
             <a:fld id="{052ECE81-C73C-E543-9046-300010F65159}" type="datetimeFigureOut">
               <a:rPr lang="en-RU" smtClean="0"/>
-              <a:t>20.12.2020</a:t>
+              <a:t>15.01.2021</a:t>
             </a:fld>
             <a:endParaRPr lang="en-RU"/>
           </a:p>
@@ -463,7 +475,7 @@
           <a:p>
             <a:fld id="{052ECE81-C73C-E543-9046-300010F65159}" type="datetimeFigureOut">
               <a:rPr lang="en-RU" smtClean="0"/>
-              <a:t>20.12.2020</a:t>
+              <a:t>15.01.2021</a:t>
             </a:fld>
             <a:endParaRPr lang="en-RU"/>
           </a:p>
@@ -673,7 +685,7 @@
           <a:p>
             <a:fld id="{052ECE81-C73C-E543-9046-300010F65159}" type="datetimeFigureOut">
               <a:rPr lang="en-RU" smtClean="0"/>
-              <a:t>20.12.2020</a:t>
+              <a:t>15.01.2021</a:t>
             </a:fld>
             <a:endParaRPr lang="en-RU"/>
           </a:p>
@@ -1140,7 +1152,7 @@
           <a:p>
             <a:fld id="{052ECE81-C73C-E543-9046-300010F65159}" type="datetimeFigureOut">
               <a:rPr lang="en-RU" smtClean="0"/>
-              <a:t>20.12.2020</a:t>
+              <a:t>15.01.2021</a:t>
             </a:fld>
             <a:endParaRPr lang="en-RU"/>
           </a:p>
@@ -1416,7 +1428,7 @@
           <a:p>
             <a:fld id="{052ECE81-C73C-E543-9046-300010F65159}" type="datetimeFigureOut">
               <a:rPr lang="en-RU" smtClean="0"/>
-              <a:t>20.12.2020</a:t>
+              <a:t>15.01.2021</a:t>
             </a:fld>
             <a:endParaRPr lang="en-RU"/>
           </a:p>
@@ -1684,7 +1696,7 @@
           <a:p>
             <a:fld id="{052ECE81-C73C-E543-9046-300010F65159}" type="datetimeFigureOut">
               <a:rPr lang="en-RU" smtClean="0"/>
-              <a:t>20.12.2020</a:t>
+              <a:t>15.01.2021</a:t>
             </a:fld>
             <a:endParaRPr lang="en-RU"/>
           </a:p>
@@ -2099,7 +2111,7 @@
           <a:p>
             <a:fld id="{052ECE81-C73C-E543-9046-300010F65159}" type="datetimeFigureOut">
               <a:rPr lang="en-RU" smtClean="0"/>
-              <a:t>20.12.2020</a:t>
+              <a:t>15.01.2021</a:t>
             </a:fld>
             <a:endParaRPr lang="en-RU"/>
           </a:p>
@@ -2241,7 +2253,7 @@
           <a:p>
             <a:fld id="{052ECE81-C73C-E543-9046-300010F65159}" type="datetimeFigureOut">
               <a:rPr lang="en-RU" smtClean="0"/>
-              <a:t>20.12.2020</a:t>
+              <a:t>15.01.2021</a:t>
             </a:fld>
             <a:endParaRPr lang="en-RU"/>
           </a:p>
@@ -2354,7 +2366,7 @@
           <a:p>
             <a:fld id="{052ECE81-C73C-E543-9046-300010F65159}" type="datetimeFigureOut">
               <a:rPr lang="en-RU" smtClean="0"/>
-              <a:t>20.12.2020</a:t>
+              <a:t>15.01.2021</a:t>
             </a:fld>
             <a:endParaRPr lang="en-RU"/>
           </a:p>
@@ -2667,7 +2679,7 @@
           <a:p>
             <a:fld id="{052ECE81-C73C-E543-9046-300010F65159}" type="datetimeFigureOut">
               <a:rPr lang="en-RU" smtClean="0"/>
-              <a:t>20.12.2020</a:t>
+              <a:t>15.01.2021</a:t>
             </a:fld>
             <a:endParaRPr lang="en-RU"/>
           </a:p>
@@ -2956,7 +2968,7 @@
           <a:p>
             <a:fld id="{052ECE81-C73C-E543-9046-300010F65159}" type="datetimeFigureOut">
               <a:rPr lang="en-RU" smtClean="0"/>
-              <a:t>20.12.2020</a:t>
+              <a:t>15.01.2021</a:t>
             </a:fld>
             <a:endParaRPr lang="en-RU"/>
           </a:p>
@@ -3199,7 +3211,7 @@
           <a:p>
             <a:fld id="{052ECE81-C73C-E543-9046-300010F65159}" type="datetimeFigureOut">
               <a:rPr lang="en-RU" smtClean="0"/>
-              <a:t>20.12.2020</a:t>
+              <a:t>15.01.2021</a:t>
             </a:fld>
             <a:endParaRPr lang="en-RU"/>
           </a:p>
@@ -3686,6 +3698,690 @@
 </p:sld>
 </file>
 
+<file path=ppt/slides/slide10.xml><?xml version="1.0" encoding="utf-8"?>
+<p:sld xmlns:a="http://schemas.openxmlformats.org/drawingml/2006/main" xmlns:r="http://schemas.openxmlformats.org/officeDocument/2006/relationships" xmlns:p="http://schemas.openxmlformats.org/presentationml/2006/main">
+  <p:cSld>
+    <p:spTree>
+      <p:nvGrpSpPr>
+        <p:cNvPr id="1" name=""/>
+        <p:cNvGrpSpPr/>
+        <p:nvPr/>
+      </p:nvGrpSpPr>
+      <p:grpSpPr>
+        <a:xfrm>
+          <a:off x="0" y="0"/>
+          <a:ext cx="0" cy="0"/>
+          <a:chOff x="0" y="0"/>
+          <a:chExt cx="0" cy="0"/>
+        </a:xfrm>
+      </p:grpSpPr>
+      <p:sp>
+        <p:nvSpPr>
+          <p:cNvPr id="3" name="Text Placeholder 2">
+            <a:extLst>
+              <a:ext uri="{FF2B5EF4-FFF2-40B4-BE49-F238E27FC236}">
+                <a16:creationId xmlns:a16="http://schemas.microsoft.com/office/drawing/2014/main" id="{99F5DBC8-929E-455F-BA07-52462E7B4FC5}"/>
+              </a:ext>
+            </a:extLst>
+          </p:cNvPr>
+          <p:cNvSpPr>
+            <a:spLocks noGrp="1"/>
+          </p:cNvSpPr>
+          <p:nvPr>
+            <p:ph type="body" sz="quarter" idx="10"/>
+          </p:nvPr>
+        </p:nvSpPr>
+        <p:spPr/>
+        <p:txBody>
+          <a:bodyPr/>
+          <a:lstStyle/>
+          <a:p>
+            <a:r>
+              <a:rPr lang="en-US" dirty="0"/>
+              <a:t>network-scripts</a:t>
+            </a:r>
+          </a:p>
+        </p:txBody>
+      </p:sp>
+      <p:sp>
+        <p:nvSpPr>
+          <p:cNvPr id="2" name="TextBox 1">
+            <a:extLst>
+              <a:ext uri="{FF2B5EF4-FFF2-40B4-BE49-F238E27FC236}">
+                <a16:creationId xmlns:a16="http://schemas.microsoft.com/office/drawing/2014/main" id="{681607C0-ACC4-FD4A-9277-ED923B26072B}"/>
+              </a:ext>
+            </a:extLst>
+          </p:cNvPr>
+          <p:cNvSpPr txBox="1"/>
+          <p:nvPr/>
+        </p:nvSpPr>
+        <p:spPr>
+          <a:xfrm>
+            <a:off x="1174044" y="1998133"/>
+            <a:ext cx="4019114" cy="369332"/>
+          </a:xfrm>
+          <a:prstGeom prst="rect">
+            <a:avLst/>
+          </a:prstGeom>
+          <a:noFill/>
+        </p:spPr>
+        <p:txBody>
+          <a:bodyPr wrap="none" rtlCol="0">
+            <a:spAutoFit/>
+          </a:bodyPr>
+          <a:lstStyle/>
+          <a:p>
+            <a:r>
+              <a:rPr lang="en-GB" dirty="0"/>
+              <a:t>/etc/</a:t>
+            </a:r>
+            <a:r>
+              <a:rPr lang="en-GB" dirty="0" err="1"/>
+              <a:t>sysconfig</a:t>
+            </a:r>
+            <a:r>
+              <a:rPr lang="en-GB" dirty="0"/>
+              <a:t>/network-scripts/ifcfg-eth0</a:t>
+            </a:r>
+            <a:endParaRPr lang="en-RU" dirty="0"/>
+          </a:p>
+        </p:txBody>
+      </p:sp>
+    </p:spTree>
+    <p:extLst>
+      <p:ext uri="{BB962C8B-B14F-4D97-AF65-F5344CB8AC3E}">
+        <p14:creationId xmlns:p14="http://schemas.microsoft.com/office/powerpoint/2010/main" val="1602770401"/>
+      </p:ext>
+    </p:extLst>
+  </p:cSld>
+  <p:clrMapOvr>
+    <a:masterClrMapping/>
+  </p:clrMapOvr>
+</p:sld>
+</file>
+
+<file path=ppt/slides/slide11.xml><?xml version="1.0" encoding="utf-8"?>
+<p:sld xmlns:a="http://schemas.openxmlformats.org/drawingml/2006/main" xmlns:r="http://schemas.openxmlformats.org/officeDocument/2006/relationships" xmlns:p="http://schemas.openxmlformats.org/presentationml/2006/main">
+  <p:cSld>
+    <p:spTree>
+      <p:nvGrpSpPr>
+        <p:cNvPr id="1" name=""/>
+        <p:cNvGrpSpPr/>
+        <p:nvPr/>
+      </p:nvGrpSpPr>
+      <p:grpSpPr>
+        <a:xfrm>
+          <a:off x="0" y="0"/>
+          <a:ext cx="0" cy="0"/>
+          <a:chOff x="0" y="0"/>
+          <a:chExt cx="0" cy="0"/>
+        </a:xfrm>
+      </p:grpSpPr>
+      <p:sp>
+        <p:nvSpPr>
+          <p:cNvPr id="3" name="Text Placeholder 2">
+            <a:extLst>
+              <a:ext uri="{FF2B5EF4-FFF2-40B4-BE49-F238E27FC236}">
+                <a16:creationId xmlns:a16="http://schemas.microsoft.com/office/drawing/2014/main" id="{99F5DBC8-929E-455F-BA07-52462E7B4FC5}"/>
+              </a:ext>
+            </a:extLst>
+          </p:cNvPr>
+          <p:cNvSpPr>
+            <a:spLocks noGrp="1"/>
+          </p:cNvSpPr>
+          <p:nvPr>
+            <p:ph type="body" sz="quarter" idx="10"/>
+          </p:nvPr>
+        </p:nvSpPr>
+        <p:spPr/>
+        <p:txBody>
+          <a:bodyPr/>
+          <a:lstStyle/>
+          <a:p>
+            <a:r>
+              <a:rPr lang="en-US" dirty="0"/>
+              <a:t>Network Manager</a:t>
+            </a:r>
+          </a:p>
+        </p:txBody>
+      </p:sp>
+    </p:spTree>
+    <p:extLst>
+      <p:ext uri="{BB962C8B-B14F-4D97-AF65-F5344CB8AC3E}">
+        <p14:creationId xmlns:p14="http://schemas.microsoft.com/office/powerpoint/2010/main" val="1688876212"/>
+      </p:ext>
+    </p:extLst>
+  </p:cSld>
+  <p:clrMapOvr>
+    <a:masterClrMapping/>
+  </p:clrMapOvr>
+</p:sld>
+</file>
+
+<file path=ppt/slides/slide12.xml><?xml version="1.0" encoding="utf-8"?>
+<p:sld xmlns:a="http://schemas.openxmlformats.org/drawingml/2006/main" xmlns:r="http://schemas.openxmlformats.org/officeDocument/2006/relationships" xmlns:p="http://schemas.openxmlformats.org/presentationml/2006/main">
+  <p:cSld>
+    <p:spTree>
+      <p:nvGrpSpPr>
+        <p:cNvPr id="1" name=""/>
+        <p:cNvGrpSpPr/>
+        <p:nvPr/>
+      </p:nvGrpSpPr>
+      <p:grpSpPr>
+        <a:xfrm>
+          <a:off x="0" y="0"/>
+          <a:ext cx="0" cy="0"/>
+          <a:chOff x="0" y="0"/>
+          <a:chExt cx="0" cy="0"/>
+        </a:xfrm>
+      </p:grpSpPr>
+      <p:sp>
+        <p:nvSpPr>
+          <p:cNvPr id="3" name="Text Placeholder 2">
+            <a:extLst>
+              <a:ext uri="{FF2B5EF4-FFF2-40B4-BE49-F238E27FC236}">
+                <a16:creationId xmlns:a16="http://schemas.microsoft.com/office/drawing/2014/main" id="{99F5DBC8-929E-455F-BA07-52462E7B4FC5}"/>
+              </a:ext>
+            </a:extLst>
+          </p:cNvPr>
+          <p:cNvSpPr>
+            <a:spLocks noGrp="1"/>
+          </p:cNvSpPr>
+          <p:nvPr>
+            <p:ph type="body" sz="quarter" idx="10"/>
+          </p:nvPr>
+        </p:nvSpPr>
+        <p:spPr/>
+        <p:txBody>
+          <a:bodyPr/>
+          <a:lstStyle/>
+          <a:p>
+            <a:r>
+              <a:rPr lang="en-US" dirty="0"/>
+              <a:t>iptables – firewall, </a:t>
+            </a:r>
+            <a:r>
+              <a:rPr lang="en-US" dirty="0" err="1"/>
+              <a:t>nat</a:t>
+            </a:r>
+            <a:r>
+              <a:rPr lang="en-US" dirty="0"/>
+              <a:t>/pat, traffic</a:t>
+            </a:r>
+          </a:p>
+        </p:txBody>
+      </p:sp>
+      <p:pic>
+        <p:nvPicPr>
+          <p:cNvPr id="2" name="Picture 1">
+            <a:extLst>
+              <a:ext uri="{FF2B5EF4-FFF2-40B4-BE49-F238E27FC236}">
+                <a16:creationId xmlns:a16="http://schemas.microsoft.com/office/drawing/2014/main" id="{CA77BC84-B010-884F-AE90-6F044269139D}"/>
+              </a:ext>
+            </a:extLst>
+          </p:cNvPr>
+          <p:cNvPicPr>
+            <a:picLocks noChangeAspect="1"/>
+          </p:cNvPicPr>
+          <p:nvPr/>
+        </p:nvPicPr>
+        <p:blipFill>
+          <a:blip r:embed="rId2"/>
+          <a:stretch>
+            <a:fillRect/>
+          </a:stretch>
+        </p:blipFill>
+        <p:spPr>
+          <a:xfrm>
+            <a:off x="2214171" y="1603023"/>
+            <a:ext cx="7763657" cy="4301066"/>
+          </a:xfrm>
+          <a:prstGeom prst="rect">
+            <a:avLst/>
+          </a:prstGeom>
+        </p:spPr>
+      </p:pic>
+    </p:spTree>
+    <p:extLst>
+      <p:ext uri="{BB962C8B-B14F-4D97-AF65-F5344CB8AC3E}">
+        <p14:creationId xmlns:p14="http://schemas.microsoft.com/office/powerpoint/2010/main" val="2607728773"/>
+      </p:ext>
+    </p:extLst>
+  </p:cSld>
+  <p:clrMapOvr>
+    <a:masterClrMapping/>
+  </p:clrMapOvr>
+</p:sld>
+</file>
+
+<file path=ppt/slides/slide13.xml><?xml version="1.0" encoding="utf-8"?>
+<p:sld xmlns:a="http://schemas.openxmlformats.org/drawingml/2006/main" xmlns:r="http://schemas.openxmlformats.org/officeDocument/2006/relationships" xmlns:p="http://schemas.openxmlformats.org/presentationml/2006/main">
+  <p:cSld>
+    <p:spTree>
+      <p:nvGrpSpPr>
+        <p:cNvPr id="1" name=""/>
+        <p:cNvGrpSpPr/>
+        <p:nvPr/>
+      </p:nvGrpSpPr>
+      <p:grpSpPr>
+        <a:xfrm>
+          <a:off x="0" y="0"/>
+          <a:ext cx="0" cy="0"/>
+          <a:chOff x="0" y="0"/>
+          <a:chExt cx="0" cy="0"/>
+        </a:xfrm>
+      </p:grpSpPr>
+      <p:sp>
+        <p:nvSpPr>
+          <p:cNvPr id="3" name="Text Placeholder 2">
+            <a:extLst>
+              <a:ext uri="{FF2B5EF4-FFF2-40B4-BE49-F238E27FC236}">
+                <a16:creationId xmlns:a16="http://schemas.microsoft.com/office/drawing/2014/main" id="{99F5DBC8-929E-455F-BA07-52462E7B4FC5}"/>
+              </a:ext>
+            </a:extLst>
+          </p:cNvPr>
+          <p:cNvSpPr>
+            <a:spLocks noGrp="1"/>
+          </p:cNvSpPr>
+          <p:nvPr>
+            <p:ph type="body" sz="quarter" idx="10"/>
+          </p:nvPr>
+        </p:nvSpPr>
+        <p:spPr/>
+        <p:txBody>
+          <a:bodyPr/>
+          <a:lstStyle/>
+          <a:p>
+            <a:r>
+              <a:rPr lang="en-US" dirty="0" err="1"/>
+              <a:t>strace</a:t>
+            </a:r>
+            <a:r>
+              <a:rPr lang="en-US" dirty="0"/>
+              <a:t>, </a:t>
+            </a:r>
+            <a:r>
+              <a:rPr lang="en-US" dirty="0" err="1"/>
+              <a:t>ptrace</a:t>
+            </a:r>
+            <a:r>
+              <a:rPr lang="en-US" dirty="0"/>
+              <a:t>, </a:t>
+            </a:r>
+            <a:r>
+              <a:rPr lang="en-US" dirty="0" err="1"/>
+              <a:t>ltrace</a:t>
+            </a:r>
+            <a:endParaRPr lang="en-US" dirty="0"/>
+          </a:p>
+        </p:txBody>
+      </p:sp>
+    </p:spTree>
+    <p:extLst>
+      <p:ext uri="{BB962C8B-B14F-4D97-AF65-F5344CB8AC3E}">
+        <p14:creationId xmlns:p14="http://schemas.microsoft.com/office/powerpoint/2010/main" val="1357597757"/>
+      </p:ext>
+    </p:extLst>
+  </p:cSld>
+  <p:clrMapOvr>
+    <a:masterClrMapping/>
+  </p:clrMapOvr>
+</p:sld>
+</file>
+
+<file path=ppt/slides/slide14.xml><?xml version="1.0" encoding="utf-8"?>
+<p:sld xmlns:a="http://schemas.openxmlformats.org/drawingml/2006/main" xmlns:r="http://schemas.openxmlformats.org/officeDocument/2006/relationships" xmlns:p="http://schemas.openxmlformats.org/presentationml/2006/main">
+  <p:cSld>
+    <p:spTree>
+      <p:nvGrpSpPr>
+        <p:cNvPr id="1" name=""/>
+        <p:cNvGrpSpPr/>
+        <p:nvPr/>
+      </p:nvGrpSpPr>
+      <p:grpSpPr>
+        <a:xfrm>
+          <a:off x="0" y="0"/>
+          <a:ext cx="0" cy="0"/>
+          <a:chOff x="0" y="0"/>
+          <a:chExt cx="0" cy="0"/>
+        </a:xfrm>
+      </p:grpSpPr>
+      <p:sp>
+        <p:nvSpPr>
+          <p:cNvPr id="3" name="Text Placeholder 2">
+            <a:extLst>
+              <a:ext uri="{FF2B5EF4-FFF2-40B4-BE49-F238E27FC236}">
+                <a16:creationId xmlns:a16="http://schemas.microsoft.com/office/drawing/2014/main" id="{99F5DBC8-929E-455F-BA07-52462E7B4FC5}"/>
+              </a:ext>
+            </a:extLst>
+          </p:cNvPr>
+          <p:cNvSpPr>
+            <a:spLocks noGrp="1"/>
+          </p:cNvSpPr>
+          <p:nvPr>
+            <p:ph type="body" sz="quarter" idx="10"/>
+          </p:nvPr>
+        </p:nvSpPr>
+        <p:spPr/>
+        <p:txBody>
+          <a:bodyPr/>
+          <a:lstStyle/>
+          <a:p>
+            <a:r>
+              <a:rPr lang="en-US" dirty="0"/>
+              <a:t>X server</a:t>
+            </a:r>
+          </a:p>
+        </p:txBody>
+      </p:sp>
+      <p:sp>
+        <p:nvSpPr>
+          <p:cNvPr id="2" name="TextBox 1">
+            <a:extLst>
+              <a:ext uri="{FF2B5EF4-FFF2-40B4-BE49-F238E27FC236}">
+                <a16:creationId xmlns:a16="http://schemas.microsoft.com/office/drawing/2014/main" id="{FF4641C0-623D-CF45-83E2-CAA071F367A9}"/>
+              </a:ext>
+            </a:extLst>
+          </p:cNvPr>
+          <p:cNvSpPr txBox="1"/>
+          <p:nvPr/>
+        </p:nvSpPr>
+        <p:spPr>
+          <a:xfrm>
+            <a:off x="440266" y="1433689"/>
+            <a:ext cx="4790863" cy="369332"/>
+          </a:xfrm>
+          <a:prstGeom prst="rect">
+            <a:avLst/>
+          </a:prstGeom>
+          <a:noFill/>
+        </p:spPr>
+        <p:txBody>
+          <a:bodyPr wrap="none" rtlCol="0">
+            <a:spAutoFit/>
+          </a:bodyPr>
+          <a:lstStyle/>
+          <a:p>
+            <a:r>
+              <a:rPr lang="en-GB" dirty="0"/>
+              <a:t>https://</a:t>
+            </a:r>
+            <a:r>
+              <a:rPr lang="en-GB" dirty="0" err="1"/>
+              <a:t>ru.wikipedia.org</a:t>
+            </a:r>
+            <a:r>
+              <a:rPr lang="en-GB" dirty="0"/>
+              <a:t>/wiki/</a:t>
+            </a:r>
+            <a:r>
+              <a:rPr lang="en-GB" dirty="0" err="1"/>
+              <a:t>X_Window_System</a:t>
+            </a:r>
+            <a:endParaRPr lang="en-RU" dirty="0"/>
+          </a:p>
+        </p:txBody>
+      </p:sp>
+      <p:pic>
+        <p:nvPicPr>
+          <p:cNvPr id="4" name="Picture 3">
+            <a:extLst>
+              <a:ext uri="{FF2B5EF4-FFF2-40B4-BE49-F238E27FC236}">
+                <a16:creationId xmlns:a16="http://schemas.microsoft.com/office/drawing/2014/main" id="{E63FDA71-52BD-1D49-8F34-EB17B6596A01}"/>
+              </a:ext>
+            </a:extLst>
+          </p:cNvPr>
+          <p:cNvPicPr>
+            <a:picLocks noChangeAspect="1"/>
+          </p:cNvPicPr>
+          <p:nvPr/>
+        </p:nvPicPr>
+        <p:blipFill>
+          <a:blip r:embed="rId2"/>
+          <a:stretch>
+            <a:fillRect/>
+          </a:stretch>
+        </p:blipFill>
+        <p:spPr>
+          <a:xfrm>
+            <a:off x="280812" y="2932010"/>
+            <a:ext cx="4291188" cy="3570770"/>
+          </a:xfrm>
+          <a:prstGeom prst="rect">
+            <a:avLst/>
+          </a:prstGeom>
+        </p:spPr>
+      </p:pic>
+      <p:pic>
+        <p:nvPicPr>
+          <p:cNvPr id="5" name="Picture 4">
+            <a:extLst>
+              <a:ext uri="{FF2B5EF4-FFF2-40B4-BE49-F238E27FC236}">
+                <a16:creationId xmlns:a16="http://schemas.microsoft.com/office/drawing/2014/main" id="{CB15AFA2-9BF4-304E-A51A-83ECF7156BE5}"/>
+              </a:ext>
+            </a:extLst>
+          </p:cNvPr>
+          <p:cNvPicPr>
+            <a:picLocks noChangeAspect="1"/>
+          </p:cNvPicPr>
+          <p:nvPr/>
+        </p:nvPicPr>
+        <p:blipFill>
+          <a:blip r:embed="rId3"/>
+          <a:stretch>
+            <a:fillRect/>
+          </a:stretch>
+        </p:blipFill>
+        <p:spPr>
+          <a:xfrm>
+            <a:off x="8624710" y="1254287"/>
+            <a:ext cx="2935111" cy="4954467"/>
+          </a:xfrm>
+          <a:prstGeom prst="rect">
+            <a:avLst/>
+          </a:prstGeom>
+        </p:spPr>
+      </p:pic>
+      <p:sp>
+        <p:nvSpPr>
+          <p:cNvPr id="6" name="TextBox 5">
+            <a:extLst>
+              <a:ext uri="{FF2B5EF4-FFF2-40B4-BE49-F238E27FC236}">
+                <a16:creationId xmlns:a16="http://schemas.microsoft.com/office/drawing/2014/main" id="{2918B3B8-B2B6-534F-B2CD-C94CB1F2414C}"/>
+              </a:ext>
+            </a:extLst>
+          </p:cNvPr>
+          <p:cNvSpPr txBox="1"/>
+          <p:nvPr/>
+        </p:nvSpPr>
+        <p:spPr>
+          <a:xfrm>
+            <a:off x="440266" y="1980856"/>
+            <a:ext cx="7416800" cy="646331"/>
+          </a:xfrm>
+          <a:prstGeom prst="rect">
+            <a:avLst/>
+          </a:prstGeom>
+          <a:noFill/>
+        </p:spPr>
+        <p:txBody>
+          <a:bodyPr wrap="square" rtlCol="0">
+            <a:spAutoFit/>
+          </a:bodyPr>
+          <a:lstStyle/>
+          <a:p>
+            <a:r>
+              <a:rPr lang="en-GB" dirty="0"/>
+              <a:t>The </a:t>
+            </a:r>
+            <a:r>
+              <a:rPr lang="en-GB" b="1" dirty="0"/>
+              <a:t>X Window System</a:t>
+            </a:r>
+            <a:r>
+              <a:rPr lang="en-GB" dirty="0"/>
+              <a:t> (</a:t>
+            </a:r>
+            <a:r>
+              <a:rPr lang="en-GB" b="1" dirty="0"/>
+              <a:t>X11</a:t>
+            </a:r>
+            <a:r>
+              <a:rPr lang="en-GB" dirty="0"/>
+              <a:t>, or simply </a:t>
+            </a:r>
+            <a:r>
+              <a:rPr lang="en-GB" b="1" dirty="0"/>
+              <a:t>X</a:t>
+            </a:r>
+            <a:r>
+              <a:rPr lang="en-GB" dirty="0"/>
+              <a:t>) is a </a:t>
+            </a:r>
+            <a:r>
+              <a:rPr lang="en-GB" dirty="0">
+                <a:hlinkClick r:id="rId4" tooltip="Windowing system"/>
+              </a:rPr>
+              <a:t>windowing system</a:t>
+            </a:r>
+            <a:r>
+              <a:rPr lang="en-GB" dirty="0"/>
+              <a:t> for bitmap displays, common on Unix-like operating systems.</a:t>
+            </a:r>
+            <a:endParaRPr lang="en-RU" dirty="0"/>
+          </a:p>
+        </p:txBody>
+      </p:sp>
+    </p:spTree>
+    <p:extLst>
+      <p:ext uri="{BB962C8B-B14F-4D97-AF65-F5344CB8AC3E}">
+        <p14:creationId xmlns:p14="http://schemas.microsoft.com/office/powerpoint/2010/main" val="3186282605"/>
+      </p:ext>
+    </p:extLst>
+  </p:cSld>
+  <p:clrMapOvr>
+    <a:masterClrMapping/>
+  </p:clrMapOvr>
+</p:sld>
+</file>
+
+<file path=ppt/slides/slide15.xml><?xml version="1.0" encoding="utf-8"?>
+<p:sld xmlns:a="http://schemas.openxmlformats.org/drawingml/2006/main" xmlns:r="http://schemas.openxmlformats.org/officeDocument/2006/relationships" xmlns:p="http://schemas.openxmlformats.org/presentationml/2006/main">
+  <p:cSld>
+    <p:spTree>
+      <p:nvGrpSpPr>
+        <p:cNvPr id="1" name=""/>
+        <p:cNvGrpSpPr/>
+        <p:nvPr/>
+      </p:nvGrpSpPr>
+      <p:grpSpPr>
+        <a:xfrm>
+          <a:off x="0" y="0"/>
+          <a:ext cx="0" cy="0"/>
+          <a:chOff x="0" y="0"/>
+          <a:chExt cx="0" cy="0"/>
+        </a:xfrm>
+      </p:grpSpPr>
+      <p:sp>
+        <p:nvSpPr>
+          <p:cNvPr id="3" name="Text Placeholder 2">
+            <a:extLst>
+              <a:ext uri="{FF2B5EF4-FFF2-40B4-BE49-F238E27FC236}">
+                <a16:creationId xmlns:a16="http://schemas.microsoft.com/office/drawing/2014/main" id="{99F5DBC8-929E-455F-BA07-52462E7B4FC5}"/>
+              </a:ext>
+            </a:extLst>
+          </p:cNvPr>
+          <p:cNvSpPr>
+            <a:spLocks noGrp="1"/>
+          </p:cNvSpPr>
+          <p:nvPr>
+            <p:ph type="body" sz="quarter" idx="10"/>
+          </p:nvPr>
+        </p:nvSpPr>
+        <p:spPr/>
+        <p:txBody>
+          <a:bodyPr/>
+          <a:lstStyle/>
+          <a:p>
+            <a:r>
+              <a:rPr lang="en-US" dirty="0" err="1"/>
+              <a:t>SELinux</a:t>
+            </a:r>
+            <a:r>
+              <a:rPr lang="en-US" dirty="0"/>
+              <a:t> – security enhanced </a:t>
+            </a:r>
+            <a:r>
+              <a:rPr lang="en-US" dirty="0" err="1"/>
+              <a:t>linux</a:t>
+            </a:r>
+            <a:endParaRPr lang="en-US" dirty="0"/>
+          </a:p>
+        </p:txBody>
+      </p:sp>
+      <p:sp>
+        <p:nvSpPr>
+          <p:cNvPr id="2" name="TextBox 1">
+            <a:extLst>
+              <a:ext uri="{FF2B5EF4-FFF2-40B4-BE49-F238E27FC236}">
+                <a16:creationId xmlns:a16="http://schemas.microsoft.com/office/drawing/2014/main" id="{E25D7032-8435-C04C-81A4-341312D3A8B5}"/>
+              </a:ext>
+            </a:extLst>
+          </p:cNvPr>
+          <p:cNvSpPr txBox="1"/>
+          <p:nvPr/>
+        </p:nvSpPr>
+        <p:spPr>
+          <a:xfrm>
+            <a:off x="1467556" y="2133600"/>
+            <a:ext cx="1346331" cy="1477328"/>
+          </a:xfrm>
+          <a:prstGeom prst="rect">
+            <a:avLst/>
+          </a:prstGeom>
+          <a:noFill/>
+        </p:spPr>
+        <p:txBody>
+          <a:bodyPr wrap="none" rtlCol="0">
+            <a:spAutoFit/>
+          </a:bodyPr>
+          <a:lstStyle/>
+          <a:p>
+            <a:r>
+              <a:rPr lang="en-RU" dirty="0"/>
+              <a:t>getenforce</a:t>
+            </a:r>
+          </a:p>
+          <a:p>
+            <a:r>
+              <a:rPr lang="en-RU" dirty="0"/>
+              <a:t>setenforce 0</a:t>
+            </a:r>
+          </a:p>
+          <a:p>
+            <a:endParaRPr lang="en-RU" dirty="0"/>
+          </a:p>
+          <a:p>
+            <a:endParaRPr lang="en-RU" dirty="0"/>
+          </a:p>
+          <a:p>
+            <a:endParaRPr lang="en-RU" dirty="0"/>
+          </a:p>
+        </p:txBody>
+      </p:sp>
+    </p:spTree>
+    <p:extLst>
+      <p:ext uri="{BB962C8B-B14F-4D97-AF65-F5344CB8AC3E}">
+        <p14:creationId xmlns:p14="http://schemas.microsoft.com/office/powerpoint/2010/main" val="4057229078"/>
+      </p:ext>
+    </p:extLst>
+  </p:cSld>
+  <p:clrMapOvr>
+    <a:masterClrMapping/>
+  </p:clrMapOvr>
+</p:sld>
+</file>
+
 <file path=ppt/slides/slide2.xml><?xml version="1.0" encoding="utf-8"?>
 <p:sld xmlns:a="http://schemas.openxmlformats.org/drawingml/2006/main" xmlns:r="http://schemas.openxmlformats.org/officeDocument/2006/relationships" xmlns:p="http://schemas.openxmlformats.org/presentationml/2006/main">
   <p:cSld>
@@ -3725,18 +4421,254 @@
           <a:lstStyle/>
           <a:p>
             <a:r>
-              <a:rPr lang="en-US" dirty="0" err="1"/>
-              <a:t>cron</a:t>
-            </a:r>
-            <a:r>
               <a:rPr lang="en-US" dirty="0"/>
-              <a:t>, </a:t>
-            </a:r>
-            <a:r>
-              <a:rPr lang="en-US" dirty="0" err="1"/>
-              <a:t>anacron</a:t>
-            </a:r>
-            <a:endParaRPr lang="en-US" dirty="0"/>
+              <a:t>List of base daemons</a:t>
+            </a:r>
+          </a:p>
+        </p:txBody>
+      </p:sp>
+      <p:sp>
+        <p:nvSpPr>
+          <p:cNvPr id="2" name="TextBox 1">
+            <a:extLst>
+              <a:ext uri="{FF2B5EF4-FFF2-40B4-BE49-F238E27FC236}">
+                <a16:creationId xmlns:a16="http://schemas.microsoft.com/office/drawing/2014/main" id="{FA9DEB16-8DC7-0244-A457-FEB370E65514}"/>
+              </a:ext>
+            </a:extLst>
+          </p:cNvPr>
+          <p:cNvSpPr txBox="1"/>
+          <p:nvPr/>
+        </p:nvSpPr>
+        <p:spPr>
+          <a:xfrm>
+            <a:off x="1083733" y="1704622"/>
+            <a:ext cx="5797293" cy="5078313"/>
+          </a:xfrm>
+          <a:prstGeom prst="rect">
+            <a:avLst/>
+          </a:prstGeom>
+          <a:noFill/>
+        </p:spPr>
+        <p:txBody>
+          <a:bodyPr wrap="none" rtlCol="0">
+            <a:spAutoFit/>
+          </a:bodyPr>
+          <a:lstStyle/>
+          <a:p>
+            <a:pPr marL="285750" indent="-285750">
+              <a:buFont typeface="Arial" panose="020B0604020202020204" pitchFamily="34" charset="0"/>
+              <a:buChar char="•"/>
+            </a:pPr>
+            <a:r>
+              <a:rPr lang="en-RU" dirty="0"/>
+              <a:t>init, systemd – init PID=1</a:t>
+            </a:r>
+          </a:p>
+          <a:p>
+            <a:pPr marL="285750" indent="-285750">
+              <a:buFont typeface="Arial" panose="020B0604020202020204" pitchFamily="34" charset="0"/>
+              <a:buChar char="•"/>
+            </a:pPr>
+            <a:endParaRPr lang="en-RU" dirty="0"/>
+          </a:p>
+          <a:p>
+            <a:pPr marL="285750" indent="-285750">
+              <a:buFont typeface="Arial" panose="020B0604020202020204" pitchFamily="34" charset="0"/>
+              <a:buChar char="•"/>
+            </a:pPr>
+            <a:r>
+              <a:rPr lang="en-RU" dirty="0"/>
+              <a:t>syslogd, rsyslogd – Logging service</a:t>
+            </a:r>
+          </a:p>
+          <a:p>
+            <a:pPr marL="285750" indent="-285750">
+              <a:buFont typeface="Arial" panose="020B0604020202020204" pitchFamily="34" charset="0"/>
+              <a:buChar char="•"/>
+            </a:pPr>
+            <a:r>
+              <a:rPr lang="en-RU" dirty="0"/>
+              <a:t>crond, anacron – Timetable services</a:t>
+            </a:r>
+          </a:p>
+          <a:p>
+            <a:pPr marL="285750" indent="-285750">
+              <a:buFont typeface="Arial" panose="020B0604020202020204" pitchFamily="34" charset="0"/>
+              <a:buChar char="•"/>
+            </a:pPr>
+            <a:r>
+              <a:rPr lang="en-RU" dirty="0"/>
+              <a:t>atd – execute commands at a later time</a:t>
+            </a:r>
+          </a:p>
+          <a:p>
+            <a:pPr marL="285750" indent="-285750">
+              <a:buFont typeface="Arial" panose="020B0604020202020204" pitchFamily="34" charset="0"/>
+              <a:buChar char="•"/>
+            </a:pPr>
+            <a:r>
+              <a:rPr lang="en-RU" dirty="0"/>
+              <a:t>logrotate – log files rotating service</a:t>
+            </a:r>
+          </a:p>
+          <a:p>
+            <a:pPr marL="285750" indent="-285750">
+              <a:buFont typeface="Arial" panose="020B0604020202020204" pitchFamily="34" charset="0"/>
+              <a:buChar char="•"/>
+            </a:pPr>
+            <a:r>
+              <a:rPr lang="en-RU" dirty="0"/>
+              <a:t>inet, xinet – simple services management superdaemons</a:t>
+            </a:r>
+          </a:p>
+          <a:p>
+            <a:pPr marL="285750" indent="-285750">
+              <a:buFont typeface="Arial" panose="020B0604020202020204" pitchFamily="34" charset="0"/>
+              <a:buChar char="•"/>
+            </a:pPr>
+            <a:endParaRPr lang="en-RU" dirty="0"/>
+          </a:p>
+          <a:p>
+            <a:pPr marL="285750" indent="-285750">
+              <a:buFont typeface="Arial" panose="020B0604020202020204" pitchFamily="34" charset="0"/>
+              <a:buChar char="•"/>
+            </a:pPr>
+            <a:r>
+              <a:rPr lang="en-RU" dirty="0"/>
+              <a:t>rlogind, telnetd – not secure remote login services</a:t>
+            </a:r>
+          </a:p>
+          <a:p>
+            <a:pPr marL="285750" indent="-285750">
+              <a:buFont typeface="Arial" panose="020B0604020202020204" pitchFamily="34" charset="0"/>
+              <a:buChar char="•"/>
+            </a:pPr>
+            <a:r>
+              <a:rPr lang="en-RU" dirty="0"/>
+              <a:t>sshd – OpenSSH secure shell service</a:t>
+            </a:r>
+          </a:p>
+          <a:p>
+            <a:pPr marL="285750" indent="-285750">
+              <a:buFont typeface="Arial" panose="020B0604020202020204" pitchFamily="34" charset="0"/>
+              <a:buChar char="•"/>
+            </a:pPr>
+            <a:r>
+              <a:rPr lang="en-RU" dirty="0"/>
+              <a:t>fingerd – obsolete information sharing service</a:t>
+            </a:r>
+          </a:p>
+          <a:p>
+            <a:pPr marL="285750" indent="-285750">
+              <a:buFont typeface="Arial" panose="020B0604020202020204" pitchFamily="34" charset="0"/>
+              <a:buChar char="•"/>
+            </a:pPr>
+            <a:endParaRPr lang="en-RU" dirty="0"/>
+          </a:p>
+          <a:p>
+            <a:pPr marL="285750" indent="-285750">
+              <a:buFont typeface="Arial" panose="020B0604020202020204" pitchFamily="34" charset="0"/>
+              <a:buChar char="•"/>
+            </a:pPr>
+            <a:r>
+              <a:rPr lang="en-RU" dirty="0"/>
+              <a:t>httpd – web servers http protocol service</a:t>
+            </a:r>
+          </a:p>
+          <a:p>
+            <a:pPr marL="285750" indent="-285750">
+              <a:buFont typeface="Arial" panose="020B0604020202020204" pitchFamily="34" charset="0"/>
+              <a:buChar char="•"/>
+            </a:pPr>
+            <a:r>
+              <a:rPr lang="en-RU" dirty="0"/>
+              <a:t>smtpd – mail transport protocol service </a:t>
+            </a:r>
+          </a:p>
+          <a:p>
+            <a:pPr marL="285750" indent="-285750">
+              <a:buFont typeface="Arial" panose="020B0604020202020204" pitchFamily="34" charset="0"/>
+              <a:buChar char="•"/>
+            </a:pPr>
+            <a:r>
+              <a:rPr lang="en-RU" dirty="0"/>
+              <a:t>dhcpd – ip and other protocols configuration service</a:t>
+            </a:r>
+          </a:p>
+          <a:p>
+            <a:pPr marL="285750" indent="-285750">
+              <a:buFont typeface="Arial" panose="020B0604020202020204" pitchFamily="34" charset="0"/>
+              <a:buChar char="•"/>
+            </a:pPr>
+            <a:r>
+              <a:rPr lang="en-RU" dirty="0"/>
+              <a:t>lpt – printers queue service</a:t>
+            </a:r>
+          </a:p>
+          <a:p>
+            <a:pPr marL="285750" indent="-285750">
+              <a:buFont typeface="Arial" panose="020B0604020202020204" pitchFamily="34" charset="0"/>
+              <a:buChar char="•"/>
+            </a:pPr>
+            <a:r>
+              <a:rPr lang="en-RU" dirty="0"/>
+              <a:t>nfsd– network file system | smbfs/cifs</a:t>
+            </a:r>
+          </a:p>
+          <a:p>
+            <a:pPr marL="285750" indent="-285750">
+              <a:buFont typeface="Arial" panose="020B0604020202020204" pitchFamily="34" charset="0"/>
+              <a:buChar char="•"/>
+            </a:pPr>
+            <a:endParaRPr lang="en-RU" dirty="0"/>
+          </a:p>
+        </p:txBody>
+      </p:sp>
+      <p:sp>
+        <p:nvSpPr>
+          <p:cNvPr id="4" name="TextBox 3">
+            <a:extLst>
+              <a:ext uri="{FF2B5EF4-FFF2-40B4-BE49-F238E27FC236}">
+                <a16:creationId xmlns:a16="http://schemas.microsoft.com/office/drawing/2014/main" id="{2EFA390D-DC4F-2744-AE32-14F01CBF079C}"/>
+              </a:ext>
+            </a:extLst>
+          </p:cNvPr>
+          <p:cNvSpPr txBox="1"/>
+          <p:nvPr/>
+        </p:nvSpPr>
+        <p:spPr>
+          <a:xfrm>
+            <a:off x="6254044" y="2449689"/>
+            <a:ext cx="5157309" cy="369332"/>
+          </a:xfrm>
+          <a:prstGeom prst="rect">
+            <a:avLst/>
+          </a:prstGeom>
+          <a:noFill/>
+        </p:spPr>
+        <p:txBody>
+          <a:bodyPr wrap="none" rtlCol="0">
+            <a:spAutoFit/>
+          </a:bodyPr>
+          <a:lstStyle/>
+          <a:p>
+            <a:r>
+              <a:rPr lang="en-GB" dirty="0"/>
+              <a:t>https://</a:t>
+            </a:r>
+            <a:r>
+              <a:rPr lang="en-GB" dirty="0" err="1"/>
+              <a:t>en.wikipedia.org</a:t>
+            </a:r>
+            <a:r>
+              <a:rPr lang="en-GB" dirty="0"/>
+              <a:t>/wiki/</a:t>
+            </a:r>
+            <a:r>
+              <a:rPr lang="en-GB" dirty="0" err="1"/>
+              <a:t>List_of_Unix_daemons</a:t>
+            </a:r>
+            <a:endParaRPr lang="en-RU" dirty="0"/>
           </a:p>
         </p:txBody>
       </p:sp>
@@ -3792,17 +4724,1677 @@
           <a:lstStyle/>
           <a:p>
             <a:r>
-              <a:rPr lang="en-US"/>
-              <a:t>syslog</a:t>
+              <a:rPr lang="en-US" dirty="0" err="1"/>
+              <a:t>syslogd</a:t>
+            </a:r>
+            <a:r>
+              <a:rPr lang="en-US" dirty="0"/>
+              <a:t>, </a:t>
+            </a:r>
+            <a:r>
+              <a:rPr lang="en-US" dirty="0" err="1"/>
+              <a:t>rsyslogd</a:t>
             </a:r>
             <a:endParaRPr lang="en-US" dirty="0"/>
+          </a:p>
+        </p:txBody>
+      </p:sp>
+      <p:sp>
+        <p:nvSpPr>
+          <p:cNvPr id="5" name="TextBox 4">
+            <a:extLst>
+              <a:ext uri="{FF2B5EF4-FFF2-40B4-BE49-F238E27FC236}">
+                <a16:creationId xmlns:a16="http://schemas.microsoft.com/office/drawing/2014/main" id="{24CE4EEC-070A-184E-A833-A63572015991}"/>
+              </a:ext>
+            </a:extLst>
+          </p:cNvPr>
+          <p:cNvSpPr txBox="1"/>
+          <p:nvPr/>
+        </p:nvSpPr>
+        <p:spPr>
+          <a:xfrm>
+            <a:off x="688622" y="1422400"/>
+            <a:ext cx="7314566" cy="3693319"/>
+          </a:xfrm>
+          <a:prstGeom prst="rect">
+            <a:avLst/>
+          </a:prstGeom>
+          <a:noFill/>
+        </p:spPr>
+        <p:txBody>
+          <a:bodyPr wrap="none" rtlCol="0">
+            <a:spAutoFit/>
+          </a:bodyPr>
+          <a:lstStyle/>
+          <a:p>
+            <a:r>
+              <a:rPr lang="en-RU" dirty="0"/>
+              <a:t>severity: debug, info, notice, warning, error, critical, alert, emergency - Level</a:t>
+            </a:r>
+            <a:br>
+              <a:rPr lang="en-RU" dirty="0"/>
+            </a:br>
+            <a:br>
+              <a:rPr lang="en-RU" dirty="0"/>
+            </a:br>
+            <a:br>
+              <a:rPr lang="en-RU" dirty="0"/>
+            </a:br>
+            <a:r>
+              <a:rPr lang="en-RU" dirty="0"/>
+              <a:t>facility: kern, info, mail, authpriv, cron, etc. – Who</a:t>
+            </a:r>
+          </a:p>
+          <a:p>
+            <a:endParaRPr lang="en-RU" dirty="0"/>
+          </a:p>
+          <a:p>
+            <a:endParaRPr lang="en-RU" dirty="0"/>
+          </a:p>
+          <a:p>
+            <a:r>
+              <a:rPr lang="en-RU" dirty="0"/>
+              <a:t>/etc/rsyslog.conf</a:t>
+            </a:r>
+          </a:p>
+          <a:p>
+            <a:endParaRPr lang="en-RU" dirty="0"/>
+          </a:p>
+          <a:p>
+            <a:r>
+              <a:rPr lang="en-RU" dirty="0"/>
+              <a:t>facility:severity      destination</a:t>
+            </a:r>
+          </a:p>
+          <a:p>
+            <a:endParaRPr lang="en-RU" dirty="0"/>
+          </a:p>
+          <a:p>
+            <a:r>
+              <a:rPr lang="en-RU" dirty="0"/>
+              <a:t>kern.info /var/log/kern_info.log</a:t>
+            </a:r>
+          </a:p>
+          <a:p>
+            <a:r>
+              <a:rPr lang="en-RU" dirty="0"/>
+              <a:t>mail:*      /var/log/maillog</a:t>
+            </a:r>
+          </a:p>
+          <a:p>
+            <a:r>
+              <a:rPr lang="en-RU" dirty="0"/>
+              <a:t>kern:error     @main_server</a:t>
+            </a:r>
           </a:p>
         </p:txBody>
       </p:sp>
     </p:spTree>
     <p:extLst>
       <p:ext uri="{BB962C8B-B14F-4D97-AF65-F5344CB8AC3E}">
-        <p14:creationId xmlns:p14="http://schemas.microsoft.com/office/powerpoint/2010/main" val="3186282605"/>
+        <p14:creationId xmlns:p14="http://schemas.microsoft.com/office/powerpoint/2010/main" val="1492089670"/>
+      </p:ext>
+    </p:extLst>
+  </p:cSld>
+  <p:clrMapOvr>
+    <a:masterClrMapping/>
+  </p:clrMapOvr>
+</p:sld>
+</file>
+
+<file path=ppt/slides/slide4.xml><?xml version="1.0" encoding="utf-8"?>
+<p:sld xmlns:a="http://schemas.openxmlformats.org/drawingml/2006/main" xmlns:r="http://schemas.openxmlformats.org/officeDocument/2006/relationships" xmlns:p="http://schemas.openxmlformats.org/presentationml/2006/main">
+  <p:cSld>
+    <p:spTree>
+      <p:nvGrpSpPr>
+        <p:cNvPr id="1" name=""/>
+        <p:cNvGrpSpPr/>
+        <p:nvPr/>
+      </p:nvGrpSpPr>
+      <p:grpSpPr>
+        <a:xfrm>
+          <a:off x="0" y="0"/>
+          <a:ext cx="0" cy="0"/>
+          <a:chOff x="0" y="0"/>
+          <a:chExt cx="0" cy="0"/>
+        </a:xfrm>
+      </p:grpSpPr>
+      <p:sp>
+        <p:nvSpPr>
+          <p:cNvPr id="3" name="Text Placeholder 2">
+            <a:extLst>
+              <a:ext uri="{FF2B5EF4-FFF2-40B4-BE49-F238E27FC236}">
+                <a16:creationId xmlns:a16="http://schemas.microsoft.com/office/drawing/2014/main" id="{99F5DBC8-929E-455F-BA07-52462E7B4FC5}"/>
+              </a:ext>
+            </a:extLst>
+          </p:cNvPr>
+          <p:cNvSpPr>
+            <a:spLocks noGrp="1"/>
+          </p:cNvSpPr>
+          <p:nvPr>
+            <p:ph type="body" sz="quarter" idx="10"/>
+          </p:nvPr>
+        </p:nvSpPr>
+        <p:spPr/>
+        <p:txBody>
+          <a:bodyPr/>
+          <a:lstStyle/>
+          <a:p>
+            <a:r>
+              <a:rPr lang="en-US" dirty="0" err="1"/>
+              <a:t>crond</a:t>
+            </a:r>
+            <a:endParaRPr lang="en-US" dirty="0"/>
+          </a:p>
+        </p:txBody>
+      </p:sp>
+      <p:sp>
+        <p:nvSpPr>
+          <p:cNvPr id="5" name="TextBox 4">
+            <a:extLst>
+              <a:ext uri="{FF2B5EF4-FFF2-40B4-BE49-F238E27FC236}">
+                <a16:creationId xmlns:a16="http://schemas.microsoft.com/office/drawing/2014/main" id="{2CF0E4D6-5E61-CF4D-A4E3-CF2A75324884}"/>
+              </a:ext>
+            </a:extLst>
+          </p:cNvPr>
+          <p:cNvSpPr txBox="1"/>
+          <p:nvPr/>
+        </p:nvSpPr>
+        <p:spPr>
+          <a:xfrm>
+            <a:off x="1213531" y="1806222"/>
+            <a:ext cx="1752724" cy="1754326"/>
+          </a:xfrm>
+          <a:prstGeom prst="rect">
+            <a:avLst/>
+          </a:prstGeom>
+          <a:noFill/>
+        </p:spPr>
+        <p:txBody>
+          <a:bodyPr wrap="none" rtlCol="0">
+            <a:spAutoFit/>
+          </a:bodyPr>
+          <a:lstStyle/>
+          <a:p>
+            <a:r>
+              <a:rPr lang="en-RU" dirty="0"/>
+              <a:t>/etc/crontab</a:t>
+            </a:r>
+          </a:p>
+          <a:p>
+            <a:endParaRPr lang="en-RU" dirty="0"/>
+          </a:p>
+          <a:p>
+            <a:r>
+              <a:rPr lang="en-RU" dirty="0"/>
+              <a:t>/etc/cron.d</a:t>
+            </a:r>
+          </a:p>
+          <a:p>
+            <a:endParaRPr lang="en-RU" dirty="0"/>
+          </a:p>
+          <a:p>
+            <a:endParaRPr lang="en-RU" dirty="0"/>
+          </a:p>
+          <a:p>
+            <a:r>
+              <a:rPr lang="en-RU" dirty="0"/>
+              <a:t>/var/spool/cron/</a:t>
+            </a:r>
+          </a:p>
+        </p:txBody>
+      </p:sp>
+      <p:sp>
+        <p:nvSpPr>
+          <p:cNvPr id="6" name="TextBox 5">
+            <a:extLst>
+              <a:ext uri="{FF2B5EF4-FFF2-40B4-BE49-F238E27FC236}">
+                <a16:creationId xmlns:a16="http://schemas.microsoft.com/office/drawing/2014/main" id="{EA1F483A-372C-3448-AB1A-47132517BE3A}"/>
+              </a:ext>
+            </a:extLst>
+          </p:cNvPr>
+          <p:cNvSpPr txBox="1"/>
+          <p:nvPr/>
+        </p:nvSpPr>
+        <p:spPr>
+          <a:xfrm>
+            <a:off x="1210585" y="3560548"/>
+            <a:ext cx="7840160" cy="2862322"/>
+          </a:xfrm>
+          <a:prstGeom prst="rect">
+            <a:avLst/>
+          </a:prstGeom>
+          <a:noFill/>
+        </p:spPr>
+        <p:txBody>
+          <a:bodyPr wrap="none" rtlCol="0">
+            <a:spAutoFit/>
+          </a:bodyPr>
+          <a:lstStyle/>
+          <a:p>
+            <a:endParaRPr lang="en-RU" dirty="0"/>
+          </a:p>
+          <a:p>
+            <a:r>
+              <a:rPr lang="en-GB" dirty="0"/>
+              <a:t># Example of job definition:</a:t>
+            </a:r>
+          </a:p>
+          <a:p>
+            <a:r>
+              <a:rPr lang="en-GB" dirty="0"/>
+              <a:t># .---------------- minute (0 - 59)</a:t>
+            </a:r>
+          </a:p>
+          <a:p>
+            <a:r>
+              <a:rPr lang="en-GB" dirty="0"/>
+              <a:t># |  .------------- hour (0 - 23)</a:t>
+            </a:r>
+          </a:p>
+          <a:p>
+            <a:r>
+              <a:rPr lang="en-GB" dirty="0"/>
+              <a:t># |  |  .---------- day of month (1 - 31)</a:t>
+            </a:r>
+          </a:p>
+          <a:p>
+            <a:r>
+              <a:rPr lang="en-GB" dirty="0"/>
+              <a:t># |  |  |  .------- month (1 - 12) OR </a:t>
+            </a:r>
+            <a:r>
+              <a:rPr lang="en-GB" dirty="0" err="1"/>
+              <a:t>jan,feb,mar,apr</a:t>
+            </a:r>
+            <a:r>
+              <a:rPr lang="en-GB" dirty="0"/>
+              <a:t> ...</a:t>
+            </a:r>
+          </a:p>
+          <a:p>
+            <a:r>
+              <a:rPr lang="en-GB" dirty="0"/>
+              <a:t># |  |  |  |  .---- day of week (0 - 6) (Sunday=0 or 7) OR </a:t>
+            </a:r>
+            <a:r>
+              <a:rPr lang="en-GB" dirty="0" err="1"/>
+              <a:t>sun,mon,tue,wed,thu,fri,sat</a:t>
+            </a:r>
+            <a:endParaRPr lang="en-GB" dirty="0"/>
+          </a:p>
+          <a:p>
+            <a:r>
+              <a:rPr lang="en-GB" dirty="0"/>
+              <a:t># |  |  |  |  |</a:t>
+            </a:r>
+          </a:p>
+          <a:p>
+            <a:r>
+              <a:rPr lang="en-GB" dirty="0"/>
+              <a:t># *  *  *  *  * user-name command to be executed</a:t>
+            </a:r>
+          </a:p>
+          <a:p>
+            <a:pPr marL="285750" indent="-285750">
+              <a:buFont typeface="Arial" panose="020B0604020202020204" pitchFamily="34" charset="0"/>
+              <a:buChar char="•"/>
+            </a:pPr>
+            <a:endParaRPr lang="en-RU" dirty="0"/>
+          </a:p>
+        </p:txBody>
+      </p:sp>
+    </p:spTree>
+    <p:extLst>
+      <p:ext uri="{BB962C8B-B14F-4D97-AF65-F5344CB8AC3E}">
+        <p14:creationId xmlns:p14="http://schemas.microsoft.com/office/powerpoint/2010/main" val="2988835753"/>
+      </p:ext>
+    </p:extLst>
+  </p:cSld>
+  <p:clrMapOvr>
+    <a:masterClrMapping/>
+  </p:clrMapOvr>
+</p:sld>
+</file>
+
+<file path=ppt/slides/slide5.xml><?xml version="1.0" encoding="utf-8"?>
+<p:sld xmlns:a="http://schemas.openxmlformats.org/drawingml/2006/main" xmlns:r="http://schemas.openxmlformats.org/officeDocument/2006/relationships" xmlns:p="http://schemas.openxmlformats.org/presentationml/2006/main">
+  <p:cSld>
+    <p:spTree>
+      <p:nvGrpSpPr>
+        <p:cNvPr id="1" name=""/>
+        <p:cNvGrpSpPr/>
+        <p:nvPr/>
+      </p:nvGrpSpPr>
+      <p:grpSpPr>
+        <a:xfrm>
+          <a:off x="0" y="0"/>
+          <a:ext cx="0" cy="0"/>
+          <a:chOff x="0" y="0"/>
+          <a:chExt cx="0" cy="0"/>
+        </a:xfrm>
+      </p:grpSpPr>
+      <p:sp>
+        <p:nvSpPr>
+          <p:cNvPr id="3" name="Text Placeholder 2">
+            <a:extLst>
+              <a:ext uri="{FF2B5EF4-FFF2-40B4-BE49-F238E27FC236}">
+                <a16:creationId xmlns:a16="http://schemas.microsoft.com/office/drawing/2014/main" id="{99F5DBC8-929E-455F-BA07-52462E7B4FC5}"/>
+              </a:ext>
+            </a:extLst>
+          </p:cNvPr>
+          <p:cNvSpPr>
+            <a:spLocks noGrp="1"/>
+          </p:cNvSpPr>
+          <p:nvPr>
+            <p:ph type="body" sz="quarter" idx="10"/>
+          </p:nvPr>
+        </p:nvSpPr>
+        <p:spPr/>
+        <p:txBody>
+          <a:bodyPr/>
+          <a:lstStyle/>
+          <a:p>
+            <a:r>
+              <a:rPr lang="en-US" dirty="0" err="1"/>
+              <a:t>atd</a:t>
+            </a:r>
+            <a:endParaRPr lang="en-US" dirty="0"/>
+          </a:p>
+        </p:txBody>
+      </p:sp>
+      <p:sp>
+        <p:nvSpPr>
+          <p:cNvPr id="2" name="TextBox 1">
+            <a:extLst>
+              <a:ext uri="{FF2B5EF4-FFF2-40B4-BE49-F238E27FC236}">
+                <a16:creationId xmlns:a16="http://schemas.microsoft.com/office/drawing/2014/main" id="{D4EA68CD-8032-7744-B8DF-00F6D422A6E5}"/>
+              </a:ext>
+            </a:extLst>
+          </p:cNvPr>
+          <p:cNvSpPr txBox="1"/>
+          <p:nvPr/>
+        </p:nvSpPr>
+        <p:spPr>
+          <a:xfrm>
+            <a:off x="79022" y="1320801"/>
+            <a:ext cx="11525956" cy="5047536"/>
+          </a:xfrm>
+          <a:prstGeom prst="rect">
+            <a:avLst/>
+          </a:prstGeom>
+          <a:noFill/>
+        </p:spPr>
+        <p:txBody>
+          <a:bodyPr wrap="square" rtlCol="0">
+            <a:spAutoFit/>
+          </a:bodyPr>
+          <a:lstStyle/>
+          <a:p>
+            <a:r>
+              <a:rPr lang="en-GB" sz="1400" dirty="0"/>
+              <a:t>        1. This sequence can be used at a terminal:</a:t>
+            </a:r>
+          </a:p>
+          <a:p>
+            <a:r>
+              <a:rPr lang="en-GB" sz="1400" dirty="0"/>
+              <a:t>           </a:t>
+            </a:r>
+            <a:r>
+              <a:rPr lang="en-GB" sz="1400" b="1" dirty="0"/>
+              <a:t>at</a:t>
+            </a:r>
+            <a:r>
+              <a:rPr lang="en-GB" sz="1400" dirty="0"/>
+              <a:t> </a:t>
+            </a:r>
+            <a:r>
+              <a:rPr lang="en-GB" sz="1400" b="1" dirty="0"/>
+              <a:t>-m</a:t>
+            </a:r>
+            <a:r>
+              <a:rPr lang="en-GB" sz="1400" dirty="0"/>
+              <a:t> </a:t>
+            </a:r>
+            <a:r>
+              <a:rPr lang="en-GB" sz="1400" b="1" dirty="0"/>
+              <a:t>0730</a:t>
+            </a:r>
+            <a:r>
+              <a:rPr lang="en-GB" sz="1400" dirty="0"/>
+              <a:t> </a:t>
+            </a:r>
+            <a:r>
+              <a:rPr lang="en-GB" sz="1400" b="1" dirty="0"/>
+              <a:t>tomorrow</a:t>
+            </a:r>
+            <a:endParaRPr lang="en-GB" sz="1400" dirty="0"/>
+          </a:p>
+          <a:p>
+            <a:r>
+              <a:rPr lang="en-GB" sz="1400" dirty="0"/>
+              <a:t>           </a:t>
+            </a:r>
+            <a:r>
+              <a:rPr lang="en-GB" sz="1400" b="1" dirty="0"/>
+              <a:t>sort</a:t>
+            </a:r>
+            <a:r>
+              <a:rPr lang="en-GB" sz="1400" dirty="0"/>
+              <a:t> </a:t>
+            </a:r>
+            <a:r>
+              <a:rPr lang="en-GB" sz="1400" b="1" dirty="0"/>
+              <a:t>&lt;</a:t>
+            </a:r>
+            <a:r>
+              <a:rPr lang="en-GB" sz="1400" dirty="0"/>
+              <a:t> </a:t>
+            </a:r>
+            <a:r>
+              <a:rPr lang="en-GB" sz="1400" b="1" dirty="0"/>
+              <a:t>file</a:t>
+            </a:r>
+            <a:r>
+              <a:rPr lang="en-GB" sz="1400" dirty="0"/>
+              <a:t> </a:t>
+            </a:r>
+            <a:r>
+              <a:rPr lang="en-GB" sz="1400" b="1" dirty="0"/>
+              <a:t>&gt;</a:t>
+            </a:r>
+            <a:r>
+              <a:rPr lang="en-GB" sz="1400" b="1" dirty="0" err="1"/>
+              <a:t>outfile</a:t>
+            </a:r>
+            <a:endParaRPr lang="en-GB" sz="1400" dirty="0"/>
+          </a:p>
+          <a:p>
+            <a:r>
+              <a:rPr lang="en-GB" sz="1400" dirty="0"/>
+              <a:t>           </a:t>
+            </a:r>
+            <a:r>
+              <a:rPr lang="en-GB" sz="1400" b="1" dirty="0"/>
+              <a:t>EOT</a:t>
+            </a:r>
+            <a:endParaRPr lang="en-GB" sz="1400" dirty="0"/>
+          </a:p>
+          <a:p>
+            <a:r>
+              <a:rPr lang="en-GB" sz="1400" dirty="0"/>
+              <a:t>        2. This  sequence,  which demonstrates redirecting standard error to a pipe, is useful in a command procedure (the sequence of output redirection</a:t>
+            </a:r>
+          </a:p>
+          <a:p>
+            <a:r>
+              <a:rPr lang="en-GB" sz="1400" dirty="0"/>
+              <a:t>           specifications is significant):</a:t>
+            </a:r>
+          </a:p>
+          <a:p>
+            <a:r>
+              <a:rPr lang="en-GB" sz="1400" dirty="0"/>
+              <a:t>           </a:t>
+            </a:r>
+            <a:r>
+              <a:rPr lang="en-GB" sz="1400" b="1" dirty="0"/>
+              <a:t>at</a:t>
+            </a:r>
+            <a:r>
+              <a:rPr lang="en-GB" sz="1400" dirty="0"/>
+              <a:t> </a:t>
+            </a:r>
+            <a:r>
+              <a:rPr lang="en-GB" sz="1400" b="1" dirty="0"/>
+              <a:t>now</a:t>
+            </a:r>
+            <a:r>
+              <a:rPr lang="en-GB" sz="1400" dirty="0"/>
+              <a:t> </a:t>
+            </a:r>
+            <a:r>
+              <a:rPr lang="en-GB" sz="1400" b="1" dirty="0"/>
+              <a:t>+</a:t>
+            </a:r>
+            <a:r>
+              <a:rPr lang="en-GB" sz="1400" dirty="0"/>
+              <a:t> </a:t>
+            </a:r>
+            <a:r>
+              <a:rPr lang="en-GB" sz="1400" b="1" dirty="0"/>
+              <a:t>1</a:t>
+            </a:r>
+            <a:r>
+              <a:rPr lang="en-GB" sz="1400" dirty="0"/>
+              <a:t> </a:t>
+            </a:r>
+            <a:r>
+              <a:rPr lang="en-GB" sz="1400" b="1" dirty="0"/>
+              <a:t>hour</a:t>
+            </a:r>
+            <a:r>
+              <a:rPr lang="en-GB" sz="1400" dirty="0"/>
+              <a:t> </a:t>
+            </a:r>
+            <a:r>
+              <a:rPr lang="en-GB" sz="1400" b="1" dirty="0"/>
+              <a:t>&lt;&lt;!</a:t>
+            </a:r>
+            <a:endParaRPr lang="en-GB" sz="1400" dirty="0"/>
+          </a:p>
+          <a:p>
+            <a:r>
+              <a:rPr lang="en-GB" sz="1400" dirty="0"/>
+              <a:t>           </a:t>
+            </a:r>
+            <a:r>
+              <a:rPr lang="en-GB" sz="1400" b="1" dirty="0"/>
+              <a:t>diff</a:t>
+            </a:r>
+            <a:r>
+              <a:rPr lang="en-GB" sz="1400" dirty="0"/>
+              <a:t> </a:t>
+            </a:r>
+            <a:r>
+              <a:rPr lang="en-GB" sz="1400" b="1" dirty="0"/>
+              <a:t>file1</a:t>
+            </a:r>
+            <a:r>
+              <a:rPr lang="en-GB" sz="1400" dirty="0"/>
+              <a:t> </a:t>
+            </a:r>
+            <a:r>
+              <a:rPr lang="en-GB" sz="1400" b="1" dirty="0"/>
+              <a:t>file2</a:t>
+            </a:r>
+            <a:r>
+              <a:rPr lang="en-GB" sz="1400" dirty="0"/>
+              <a:t> </a:t>
+            </a:r>
+            <a:r>
+              <a:rPr lang="en-GB" sz="1400" b="1" dirty="0"/>
+              <a:t>2&gt;&amp;1</a:t>
+            </a:r>
+            <a:r>
+              <a:rPr lang="en-GB" sz="1400" dirty="0"/>
+              <a:t> </a:t>
+            </a:r>
+            <a:r>
+              <a:rPr lang="en-GB" sz="1400" b="1" dirty="0"/>
+              <a:t>&gt;</a:t>
+            </a:r>
+            <a:r>
+              <a:rPr lang="en-GB" sz="1400" b="1" dirty="0" err="1"/>
+              <a:t>outfile</a:t>
+            </a:r>
+            <a:r>
+              <a:rPr lang="en-GB" sz="1400" dirty="0"/>
+              <a:t> </a:t>
+            </a:r>
+            <a:r>
+              <a:rPr lang="en-GB" sz="1400" b="1" dirty="0"/>
+              <a:t>|</a:t>
+            </a:r>
+            <a:r>
+              <a:rPr lang="en-GB" sz="1400" dirty="0"/>
+              <a:t> </a:t>
+            </a:r>
+            <a:r>
+              <a:rPr lang="en-GB" sz="1400" b="1" dirty="0" err="1"/>
+              <a:t>mailx</a:t>
+            </a:r>
+            <a:r>
+              <a:rPr lang="en-GB" sz="1400" dirty="0"/>
+              <a:t> </a:t>
+            </a:r>
+            <a:r>
+              <a:rPr lang="en-GB" sz="1400" b="1" dirty="0" err="1"/>
+              <a:t>mygroup</a:t>
+            </a:r>
+            <a:endParaRPr lang="en-GB" sz="1400" dirty="0"/>
+          </a:p>
+          <a:p>
+            <a:r>
+              <a:rPr lang="en-GB" sz="1400" dirty="0"/>
+              <a:t>           </a:t>
+            </a:r>
+            <a:r>
+              <a:rPr lang="en-GB" sz="1400" b="1" dirty="0"/>
+              <a:t>!</a:t>
+            </a:r>
+            <a:endParaRPr lang="en-GB" sz="1400" dirty="0"/>
+          </a:p>
+          <a:p>
+            <a:r>
+              <a:rPr lang="en-GB" sz="1400" dirty="0"/>
+              <a:t>        3. To have a job reschedule itself, </a:t>
+            </a:r>
+            <a:r>
+              <a:rPr lang="en-GB" sz="1400" u="sng" dirty="0"/>
+              <a:t>at</a:t>
+            </a:r>
+            <a:r>
+              <a:rPr lang="en-GB" sz="1400" dirty="0"/>
+              <a:t> can be invoked from within the at-job. For example, this daily processing script named </a:t>
+            </a:r>
+            <a:r>
+              <a:rPr lang="en-GB" sz="1400" b="1" dirty="0" err="1"/>
+              <a:t>my.daily</a:t>
+            </a:r>
+            <a:r>
+              <a:rPr lang="en-GB" sz="1400" dirty="0"/>
+              <a:t> runs every</a:t>
+            </a:r>
+          </a:p>
+          <a:p>
+            <a:r>
+              <a:rPr lang="en-GB" sz="1400" dirty="0"/>
+              <a:t>           day (although </a:t>
+            </a:r>
+            <a:r>
+              <a:rPr lang="en-GB" sz="1400" u="sng" dirty="0"/>
+              <a:t>crontab</a:t>
+            </a:r>
+            <a:r>
+              <a:rPr lang="en-GB" sz="1400" dirty="0"/>
+              <a:t> is a more appropriate vehicle for such work):</a:t>
+            </a:r>
+          </a:p>
+          <a:p>
+            <a:r>
+              <a:rPr lang="en-GB" sz="1400" dirty="0"/>
+              <a:t>           </a:t>
+            </a:r>
+            <a:r>
+              <a:rPr lang="en-GB" sz="1400" b="1" dirty="0"/>
+              <a:t>#</a:t>
+            </a:r>
+            <a:r>
+              <a:rPr lang="en-GB" sz="1400" dirty="0"/>
+              <a:t> </a:t>
+            </a:r>
+            <a:r>
+              <a:rPr lang="en-GB" sz="1400" b="1" dirty="0" err="1"/>
+              <a:t>my.daily</a:t>
+            </a:r>
+            <a:r>
+              <a:rPr lang="en-GB" sz="1400" dirty="0"/>
+              <a:t> </a:t>
+            </a:r>
+            <a:r>
+              <a:rPr lang="en-GB" sz="1400" b="1" dirty="0"/>
+              <a:t>runs</a:t>
+            </a:r>
+            <a:r>
+              <a:rPr lang="en-GB" sz="1400" dirty="0"/>
+              <a:t> </a:t>
+            </a:r>
+            <a:r>
+              <a:rPr lang="en-GB" sz="1400" b="1" dirty="0"/>
+              <a:t>every</a:t>
+            </a:r>
+            <a:r>
+              <a:rPr lang="en-GB" sz="1400" dirty="0"/>
+              <a:t> </a:t>
+            </a:r>
+            <a:r>
+              <a:rPr lang="en-GB" sz="1400" b="1" dirty="0"/>
+              <a:t>day</a:t>
+            </a:r>
+            <a:endParaRPr lang="en-GB" sz="1400" dirty="0"/>
+          </a:p>
+          <a:p>
+            <a:r>
+              <a:rPr lang="en-GB" sz="1400" dirty="0"/>
+              <a:t>           </a:t>
+            </a:r>
+            <a:r>
+              <a:rPr lang="en-GB" sz="1400" u="sng" dirty="0"/>
+              <a:t>daily</a:t>
+            </a:r>
+            <a:r>
+              <a:rPr lang="en-GB" sz="1400" dirty="0"/>
+              <a:t> </a:t>
+            </a:r>
+            <a:r>
+              <a:rPr lang="en-GB" sz="1400" u="sng" dirty="0"/>
+              <a:t>processing</a:t>
+            </a:r>
+            <a:br>
+              <a:rPr lang="en-GB" sz="1400" u="sng" dirty="0"/>
+            </a:br>
+            <a:r>
+              <a:rPr lang="en-GB" sz="1400" b="1" dirty="0"/>
+              <a:t>at</a:t>
+            </a:r>
+            <a:r>
+              <a:rPr lang="en-GB" sz="1400" dirty="0"/>
+              <a:t> </a:t>
+            </a:r>
+            <a:r>
+              <a:rPr lang="en-GB" sz="1400" b="1" dirty="0"/>
+              <a:t>now</a:t>
+            </a:r>
+            <a:r>
+              <a:rPr lang="en-GB" sz="1400" dirty="0"/>
+              <a:t> </a:t>
+            </a:r>
+            <a:r>
+              <a:rPr lang="en-GB" sz="1400" b="1" dirty="0"/>
+              <a:t>tomorrow</a:t>
+            </a:r>
+            <a:r>
+              <a:rPr lang="en-GB" sz="1400" dirty="0"/>
+              <a:t> </a:t>
+            </a:r>
+            <a:r>
+              <a:rPr lang="en-GB" sz="1400" b="1" dirty="0"/>
+              <a:t>&lt;</a:t>
+            </a:r>
+            <a:r>
+              <a:rPr lang="en-GB" sz="1400" dirty="0"/>
+              <a:t> </a:t>
+            </a:r>
+            <a:r>
+              <a:rPr lang="en-GB" sz="1400" b="1" dirty="0" err="1"/>
+              <a:t>my.daily</a:t>
+            </a:r>
+            <a:endParaRPr lang="en-GB" sz="1400" dirty="0"/>
+          </a:p>
+          <a:p>
+            <a:r>
+              <a:rPr lang="en-GB" sz="1400" dirty="0"/>
+              <a:t>        4. The  spacing  of  the  three portions of the POSIX locale </a:t>
+            </a:r>
+            <a:r>
+              <a:rPr lang="en-GB" sz="1400" u="sng" dirty="0" err="1"/>
+              <a:t>timespec</a:t>
+            </a:r>
+            <a:r>
+              <a:rPr lang="en-GB" sz="1400" dirty="0"/>
+              <a:t> is quite flexible as long as there are no ambiguities.  Examples of various</a:t>
+            </a:r>
+          </a:p>
+          <a:p>
+            <a:r>
+              <a:rPr lang="en-GB" sz="1400" dirty="0"/>
+              <a:t>           times and operand presentation include:</a:t>
+            </a:r>
+          </a:p>
+          <a:p>
+            <a:r>
+              <a:rPr lang="en-GB" sz="1400" dirty="0"/>
+              <a:t>           </a:t>
+            </a:r>
+            <a:r>
+              <a:rPr lang="en-GB" sz="1400" b="1" dirty="0"/>
+              <a:t>at</a:t>
+            </a:r>
+            <a:r>
+              <a:rPr lang="en-GB" sz="1400" dirty="0"/>
+              <a:t> </a:t>
+            </a:r>
+            <a:r>
+              <a:rPr lang="en-GB" sz="1400" b="1" dirty="0"/>
+              <a:t>0815am</a:t>
+            </a:r>
+            <a:r>
+              <a:rPr lang="en-GB" sz="1400" dirty="0"/>
+              <a:t> </a:t>
+            </a:r>
+            <a:r>
+              <a:rPr lang="en-GB" sz="1400" b="1" dirty="0"/>
+              <a:t>Jan</a:t>
+            </a:r>
+            <a:r>
+              <a:rPr lang="en-GB" sz="1400" dirty="0"/>
+              <a:t> </a:t>
+            </a:r>
+            <a:r>
+              <a:rPr lang="en-GB" sz="1400" b="1" dirty="0"/>
+              <a:t>24</a:t>
+            </a:r>
+            <a:endParaRPr lang="en-GB" sz="1400" dirty="0"/>
+          </a:p>
+          <a:p>
+            <a:r>
+              <a:rPr lang="en-GB" sz="1400" dirty="0"/>
+              <a:t>           </a:t>
+            </a:r>
+            <a:r>
+              <a:rPr lang="en-GB" sz="1400" b="1" dirty="0"/>
+              <a:t>at</a:t>
+            </a:r>
+            <a:r>
+              <a:rPr lang="en-GB" sz="1400" dirty="0"/>
+              <a:t> </a:t>
+            </a:r>
+            <a:r>
+              <a:rPr lang="en-GB" sz="1400" b="1" dirty="0"/>
+              <a:t>8</a:t>
+            </a:r>
+            <a:r>
+              <a:rPr lang="en-GB" sz="1400" dirty="0"/>
+              <a:t> </a:t>
+            </a:r>
+            <a:r>
+              <a:rPr lang="en-GB" sz="1400" b="1" dirty="0"/>
+              <a:t>:15amjan24</a:t>
+            </a:r>
+            <a:endParaRPr lang="en-GB" sz="1400" dirty="0"/>
+          </a:p>
+          <a:p>
+            <a:r>
+              <a:rPr lang="en-GB" sz="1400" dirty="0"/>
+              <a:t>           </a:t>
+            </a:r>
+            <a:r>
+              <a:rPr lang="en-GB" sz="1400" b="1" dirty="0"/>
+              <a:t>at</a:t>
+            </a:r>
+            <a:r>
+              <a:rPr lang="en-GB" sz="1400" dirty="0"/>
+              <a:t> </a:t>
+            </a:r>
+            <a:r>
+              <a:rPr lang="en-GB" sz="1400" b="1" dirty="0"/>
+              <a:t>now</a:t>
+            </a:r>
+            <a:r>
+              <a:rPr lang="en-GB" sz="1400" dirty="0"/>
+              <a:t> </a:t>
+            </a:r>
+            <a:r>
+              <a:rPr lang="en-GB" sz="1400" b="1" dirty="0"/>
+              <a:t>"+</a:t>
+            </a:r>
+            <a:r>
+              <a:rPr lang="en-GB" sz="1400" dirty="0"/>
+              <a:t> </a:t>
+            </a:r>
+            <a:r>
+              <a:rPr lang="en-GB" sz="1400" b="1" dirty="0"/>
+              <a:t>1day"</a:t>
+            </a:r>
+            <a:endParaRPr lang="en-GB" sz="1400" dirty="0"/>
+          </a:p>
+          <a:p>
+            <a:r>
+              <a:rPr lang="en-GB" sz="1400" dirty="0"/>
+              <a:t>           </a:t>
+            </a:r>
+            <a:r>
+              <a:rPr lang="en-GB" sz="1400" b="1" dirty="0"/>
+              <a:t>at</a:t>
+            </a:r>
+            <a:r>
+              <a:rPr lang="en-GB" sz="1400" dirty="0"/>
+              <a:t> </a:t>
+            </a:r>
+            <a:r>
+              <a:rPr lang="en-GB" sz="1400" b="1" dirty="0"/>
+              <a:t>5</a:t>
+            </a:r>
+            <a:r>
+              <a:rPr lang="en-GB" sz="1400" dirty="0"/>
+              <a:t> </a:t>
+            </a:r>
+            <a:r>
+              <a:rPr lang="en-GB" sz="1400" b="1" dirty="0"/>
+              <a:t>pm</a:t>
+            </a:r>
+            <a:r>
+              <a:rPr lang="en-GB" sz="1400" dirty="0"/>
+              <a:t> </a:t>
+            </a:r>
+            <a:r>
+              <a:rPr lang="en-GB" sz="1400" b="1" dirty="0" err="1"/>
+              <a:t>FRIday</a:t>
+            </a:r>
+            <a:endParaRPr lang="en-GB" sz="1400" dirty="0"/>
+          </a:p>
+          <a:p>
+            <a:r>
+              <a:rPr lang="en-GB" sz="1400" dirty="0"/>
+              <a:t>           </a:t>
+            </a:r>
+            <a:r>
+              <a:rPr lang="en-GB" sz="1400" b="1" dirty="0"/>
+              <a:t>at</a:t>
+            </a:r>
+            <a:r>
+              <a:rPr lang="en-GB" sz="1400" dirty="0"/>
+              <a:t> </a:t>
+            </a:r>
+            <a:r>
+              <a:rPr lang="en-GB" sz="1400" b="1" dirty="0"/>
+              <a:t>’17</a:t>
+            </a:r>
+            <a:endParaRPr lang="en-GB" sz="1400" dirty="0"/>
+          </a:p>
+          <a:p>
+            <a:r>
+              <a:rPr lang="en-GB" sz="1400" dirty="0"/>
+              <a:t>               </a:t>
+            </a:r>
+            <a:r>
+              <a:rPr lang="en-GB" sz="1400" b="1" dirty="0" err="1"/>
+              <a:t>utc</a:t>
+            </a:r>
+            <a:r>
+              <a:rPr lang="en-GB" sz="1400" b="1" dirty="0"/>
+              <a:t>+</a:t>
+            </a:r>
+            <a:endParaRPr lang="en-GB" sz="1400" dirty="0"/>
+          </a:p>
+          <a:p>
+            <a:r>
+              <a:rPr lang="en-GB" sz="1400" dirty="0"/>
+              <a:t>               </a:t>
+            </a:r>
+            <a:r>
+              <a:rPr lang="en-GB" sz="1400" b="1" dirty="0"/>
+              <a:t>30minutes’</a:t>
+            </a:r>
+            <a:endParaRPr lang="en-GB" sz="1400" dirty="0"/>
+          </a:p>
+        </p:txBody>
+      </p:sp>
+    </p:spTree>
+    <p:extLst>
+      <p:ext uri="{BB962C8B-B14F-4D97-AF65-F5344CB8AC3E}">
+        <p14:creationId xmlns:p14="http://schemas.microsoft.com/office/powerpoint/2010/main" val="2457955163"/>
+      </p:ext>
+    </p:extLst>
+  </p:cSld>
+  <p:clrMapOvr>
+    <a:masterClrMapping/>
+  </p:clrMapOvr>
+</p:sld>
+</file>
+
+<file path=ppt/slides/slide6.xml><?xml version="1.0" encoding="utf-8"?>
+<p:sld xmlns:a="http://schemas.openxmlformats.org/drawingml/2006/main" xmlns:r="http://schemas.openxmlformats.org/officeDocument/2006/relationships" xmlns:p="http://schemas.openxmlformats.org/presentationml/2006/main">
+  <p:cSld>
+    <p:spTree>
+      <p:nvGrpSpPr>
+        <p:cNvPr id="1" name=""/>
+        <p:cNvGrpSpPr/>
+        <p:nvPr/>
+      </p:nvGrpSpPr>
+      <p:grpSpPr>
+        <a:xfrm>
+          <a:off x="0" y="0"/>
+          <a:ext cx="0" cy="0"/>
+          <a:chOff x="0" y="0"/>
+          <a:chExt cx="0" cy="0"/>
+        </a:xfrm>
+      </p:grpSpPr>
+      <p:sp>
+        <p:nvSpPr>
+          <p:cNvPr id="3" name="Text Placeholder 2">
+            <a:extLst>
+              <a:ext uri="{FF2B5EF4-FFF2-40B4-BE49-F238E27FC236}">
+                <a16:creationId xmlns:a16="http://schemas.microsoft.com/office/drawing/2014/main" id="{99F5DBC8-929E-455F-BA07-52462E7B4FC5}"/>
+              </a:ext>
+            </a:extLst>
+          </p:cNvPr>
+          <p:cNvSpPr>
+            <a:spLocks noGrp="1"/>
+          </p:cNvSpPr>
+          <p:nvPr>
+            <p:ph type="body" sz="quarter" idx="10"/>
+          </p:nvPr>
+        </p:nvSpPr>
+        <p:spPr/>
+        <p:txBody>
+          <a:bodyPr/>
+          <a:lstStyle/>
+          <a:p>
+            <a:r>
+              <a:rPr lang="en-US" dirty="0" err="1"/>
+              <a:t>logrotated</a:t>
+            </a:r>
+            <a:endParaRPr lang="en-US" dirty="0"/>
+          </a:p>
+        </p:txBody>
+      </p:sp>
+      <p:sp>
+        <p:nvSpPr>
+          <p:cNvPr id="2" name="TextBox 1">
+            <a:extLst>
+              <a:ext uri="{FF2B5EF4-FFF2-40B4-BE49-F238E27FC236}">
+                <a16:creationId xmlns:a16="http://schemas.microsoft.com/office/drawing/2014/main" id="{035D293B-DCAD-E14D-9DEA-83FCB05BCC08}"/>
+              </a:ext>
+            </a:extLst>
+          </p:cNvPr>
+          <p:cNvSpPr txBox="1"/>
+          <p:nvPr/>
+        </p:nvSpPr>
+        <p:spPr>
+          <a:xfrm>
+            <a:off x="327378" y="1106311"/>
+            <a:ext cx="4684889" cy="4401205"/>
+          </a:xfrm>
+          <a:prstGeom prst="rect">
+            <a:avLst/>
+          </a:prstGeom>
+          <a:noFill/>
+        </p:spPr>
+        <p:txBody>
+          <a:bodyPr wrap="square" rtlCol="0">
+            <a:spAutoFit/>
+          </a:bodyPr>
+          <a:lstStyle/>
+          <a:p>
+            <a:r>
+              <a:rPr lang="en-GB" sz="1400" dirty="0"/>
+              <a:t>       /var/log/messages {</a:t>
+            </a:r>
+          </a:p>
+          <a:p>
+            <a:r>
+              <a:rPr lang="en-GB" sz="1400" dirty="0"/>
+              <a:t>           rotate 5</a:t>
+            </a:r>
+          </a:p>
+          <a:p>
+            <a:r>
+              <a:rPr lang="en-GB" sz="1400" dirty="0"/>
+              <a:t>           weekly</a:t>
+            </a:r>
+          </a:p>
+          <a:p>
+            <a:r>
+              <a:rPr lang="en-GB" sz="1400" dirty="0"/>
+              <a:t>           </a:t>
+            </a:r>
+            <a:r>
+              <a:rPr lang="en-GB" sz="1400" dirty="0" err="1"/>
+              <a:t>postrotate</a:t>
+            </a:r>
+            <a:endParaRPr lang="en-GB" sz="1400" dirty="0"/>
+          </a:p>
+          <a:p>
+            <a:r>
+              <a:rPr lang="en-GB" sz="1400" dirty="0"/>
+              <a:t>               /</a:t>
+            </a:r>
+            <a:r>
+              <a:rPr lang="en-GB" sz="1400" dirty="0" err="1"/>
+              <a:t>usr</a:t>
+            </a:r>
+            <a:r>
+              <a:rPr lang="en-GB" sz="1400" dirty="0"/>
+              <a:t>/bin/</a:t>
+            </a:r>
+            <a:r>
+              <a:rPr lang="en-GB" sz="1400" dirty="0" err="1"/>
+              <a:t>killall</a:t>
+            </a:r>
+            <a:r>
+              <a:rPr lang="en-GB" sz="1400" dirty="0"/>
+              <a:t> -HUP </a:t>
+            </a:r>
+            <a:r>
+              <a:rPr lang="en-GB" sz="1400" dirty="0" err="1"/>
+              <a:t>syslogd</a:t>
+            </a:r>
+            <a:endParaRPr lang="en-GB" sz="1400" dirty="0"/>
+          </a:p>
+          <a:p>
+            <a:r>
+              <a:rPr lang="en-GB" sz="1400" dirty="0"/>
+              <a:t>           </a:t>
+            </a:r>
+            <a:r>
+              <a:rPr lang="en-GB" sz="1400" dirty="0" err="1"/>
+              <a:t>endscript</a:t>
+            </a:r>
+            <a:endParaRPr lang="en-GB" sz="1400" dirty="0"/>
+          </a:p>
+          <a:p>
+            <a:r>
+              <a:rPr lang="en-GB" sz="1400" dirty="0"/>
+              <a:t>       }</a:t>
+            </a:r>
+          </a:p>
+          <a:p>
+            <a:br>
+              <a:rPr lang="en-GB" sz="1400" dirty="0"/>
+            </a:br>
+            <a:endParaRPr lang="en-GB" sz="1400" dirty="0"/>
+          </a:p>
+          <a:p>
+            <a:r>
+              <a:rPr lang="en-GB" sz="1400" dirty="0"/>
+              <a:t>       "/var/log/httpd/</a:t>
+            </a:r>
+            <a:r>
+              <a:rPr lang="en-GB" sz="1400" dirty="0" err="1"/>
+              <a:t>access.log</a:t>
+            </a:r>
+            <a:r>
+              <a:rPr lang="en-GB" sz="1400" dirty="0"/>
+              <a:t>" /var/log/httpd/</a:t>
+            </a:r>
+            <a:r>
+              <a:rPr lang="en-GB" sz="1400" dirty="0" err="1"/>
+              <a:t>error.log</a:t>
+            </a:r>
+            <a:r>
+              <a:rPr lang="en-GB" sz="1400" dirty="0"/>
+              <a:t> {</a:t>
+            </a:r>
+          </a:p>
+          <a:p>
+            <a:r>
+              <a:rPr lang="en-GB" sz="1400" dirty="0"/>
+              <a:t>           rotate 5</a:t>
+            </a:r>
+          </a:p>
+          <a:p>
+            <a:r>
+              <a:rPr lang="en-GB" sz="1400" dirty="0"/>
+              <a:t>           mail </a:t>
+            </a:r>
+            <a:r>
+              <a:rPr lang="en-GB" sz="1400" dirty="0" err="1"/>
+              <a:t>www@my.org</a:t>
+            </a:r>
+            <a:endParaRPr lang="en-GB" sz="1400" dirty="0"/>
+          </a:p>
+          <a:p>
+            <a:r>
+              <a:rPr lang="en-GB" sz="1400" dirty="0"/>
+              <a:t>           size 100k</a:t>
+            </a:r>
+          </a:p>
+          <a:p>
+            <a:r>
+              <a:rPr lang="en-GB" sz="1400" dirty="0"/>
+              <a:t>           </a:t>
+            </a:r>
+            <a:r>
+              <a:rPr lang="en-GB" sz="1400" dirty="0" err="1"/>
+              <a:t>sharedscripts</a:t>
+            </a:r>
+            <a:endParaRPr lang="en-GB" sz="1400" dirty="0"/>
+          </a:p>
+          <a:p>
+            <a:r>
+              <a:rPr lang="en-GB" sz="1400" dirty="0"/>
+              <a:t>           </a:t>
+            </a:r>
+            <a:r>
+              <a:rPr lang="en-GB" sz="1400" dirty="0" err="1"/>
+              <a:t>postrotate</a:t>
+            </a:r>
+            <a:endParaRPr lang="en-GB" sz="1400" dirty="0"/>
+          </a:p>
+          <a:p>
+            <a:r>
+              <a:rPr lang="en-GB" sz="1400" dirty="0"/>
+              <a:t>               /</a:t>
+            </a:r>
+            <a:r>
+              <a:rPr lang="en-GB" sz="1400" dirty="0" err="1"/>
+              <a:t>usr</a:t>
+            </a:r>
+            <a:r>
+              <a:rPr lang="en-GB" sz="1400" dirty="0"/>
+              <a:t>/bin/</a:t>
+            </a:r>
+            <a:r>
+              <a:rPr lang="en-GB" sz="1400" dirty="0" err="1"/>
+              <a:t>killall</a:t>
+            </a:r>
+            <a:r>
+              <a:rPr lang="en-GB" sz="1400" dirty="0"/>
+              <a:t> -HUP httpd</a:t>
+            </a:r>
+          </a:p>
+          <a:p>
+            <a:r>
+              <a:rPr lang="en-GB" sz="1400" dirty="0"/>
+              <a:t>           </a:t>
+            </a:r>
+            <a:r>
+              <a:rPr lang="en-GB" sz="1400" dirty="0" err="1"/>
+              <a:t>endscript</a:t>
+            </a:r>
+            <a:endParaRPr lang="en-GB" sz="1400" dirty="0"/>
+          </a:p>
+          <a:p>
+            <a:r>
+              <a:rPr lang="en-GB" sz="1400" dirty="0"/>
+              <a:t>       }</a:t>
+            </a:r>
+          </a:p>
+          <a:p>
+            <a:br>
+              <a:rPr lang="en-GB" sz="1400" dirty="0"/>
+            </a:br>
+            <a:endParaRPr lang="en-GB" sz="1400" dirty="0"/>
+          </a:p>
+        </p:txBody>
+      </p:sp>
+      <p:sp>
+        <p:nvSpPr>
+          <p:cNvPr id="4" name="TextBox 3">
+            <a:extLst>
+              <a:ext uri="{FF2B5EF4-FFF2-40B4-BE49-F238E27FC236}">
+                <a16:creationId xmlns:a16="http://schemas.microsoft.com/office/drawing/2014/main" id="{F1D70F59-1CC7-3441-8FBA-3870DEA08BC7}"/>
+              </a:ext>
+            </a:extLst>
+          </p:cNvPr>
+          <p:cNvSpPr txBox="1"/>
+          <p:nvPr/>
+        </p:nvSpPr>
+        <p:spPr>
+          <a:xfrm>
+            <a:off x="5396088" y="1106311"/>
+            <a:ext cx="5057423" cy="2462213"/>
+          </a:xfrm>
+          <a:prstGeom prst="rect">
+            <a:avLst/>
+          </a:prstGeom>
+          <a:noFill/>
+        </p:spPr>
+        <p:txBody>
+          <a:bodyPr wrap="square" rtlCol="0">
+            <a:spAutoFit/>
+          </a:bodyPr>
+          <a:lstStyle/>
+          <a:p>
+            <a:endParaRPr lang="en-GB" sz="1400" dirty="0"/>
+          </a:p>
+          <a:p>
+            <a:r>
+              <a:rPr lang="en-GB" sz="1400" dirty="0"/>
+              <a:t>       /var/log/news/* {</a:t>
+            </a:r>
+          </a:p>
+          <a:p>
+            <a:r>
+              <a:rPr lang="en-GB" sz="1400" dirty="0"/>
+              <a:t>           monthly</a:t>
+            </a:r>
+          </a:p>
+          <a:p>
+            <a:r>
+              <a:rPr lang="en-GB" sz="1400" dirty="0"/>
+              <a:t>           rotate 2</a:t>
+            </a:r>
+          </a:p>
+          <a:p>
+            <a:r>
+              <a:rPr lang="en-GB" sz="1400" dirty="0"/>
+              <a:t>           </a:t>
+            </a:r>
+            <a:r>
+              <a:rPr lang="en-GB" sz="1400" dirty="0" err="1"/>
+              <a:t>olddir</a:t>
+            </a:r>
+            <a:r>
+              <a:rPr lang="en-GB" sz="1400" dirty="0"/>
+              <a:t> /var/log/news/old</a:t>
+            </a:r>
+          </a:p>
+          <a:p>
+            <a:r>
+              <a:rPr lang="en-GB" sz="1400" dirty="0"/>
+              <a:t>           </a:t>
+            </a:r>
+            <a:r>
+              <a:rPr lang="en-GB" sz="1400" dirty="0" err="1"/>
+              <a:t>missingok</a:t>
+            </a:r>
+            <a:endParaRPr lang="en-GB" sz="1400" dirty="0"/>
+          </a:p>
+          <a:p>
+            <a:r>
+              <a:rPr lang="en-GB" sz="1400" dirty="0"/>
+              <a:t>           </a:t>
+            </a:r>
+            <a:r>
+              <a:rPr lang="en-GB" sz="1400" dirty="0" err="1"/>
+              <a:t>postrotate</a:t>
+            </a:r>
+            <a:endParaRPr lang="en-GB" sz="1400" dirty="0"/>
+          </a:p>
+          <a:p>
+            <a:r>
+              <a:rPr lang="en-GB" sz="1400" dirty="0"/>
+              <a:t>               kill -HUP ‘cat /var/run/</a:t>
+            </a:r>
+            <a:r>
+              <a:rPr lang="en-GB" sz="1400" dirty="0" err="1"/>
+              <a:t>inn.pid</a:t>
+            </a:r>
+            <a:r>
+              <a:rPr lang="en-GB" sz="1400" dirty="0"/>
+              <a:t>‘</a:t>
+            </a:r>
+          </a:p>
+          <a:p>
+            <a:r>
+              <a:rPr lang="en-GB" sz="1400" dirty="0"/>
+              <a:t>           </a:t>
+            </a:r>
+            <a:r>
+              <a:rPr lang="en-GB" sz="1400" dirty="0" err="1"/>
+              <a:t>endscript</a:t>
+            </a:r>
+            <a:endParaRPr lang="en-GB" sz="1400" dirty="0"/>
+          </a:p>
+          <a:p>
+            <a:r>
+              <a:rPr lang="en-GB" sz="1400" dirty="0"/>
+              <a:t>           </a:t>
+            </a:r>
+            <a:r>
+              <a:rPr lang="en-GB" sz="1400" dirty="0" err="1"/>
+              <a:t>nocompress</a:t>
+            </a:r>
+            <a:endParaRPr lang="en-GB" sz="1400" dirty="0"/>
+          </a:p>
+          <a:p>
+            <a:r>
+              <a:rPr lang="en-GB" sz="1400" dirty="0"/>
+              <a:t>       }</a:t>
+            </a:r>
+          </a:p>
+        </p:txBody>
+      </p:sp>
+    </p:spTree>
+    <p:extLst>
+      <p:ext uri="{BB962C8B-B14F-4D97-AF65-F5344CB8AC3E}">
+        <p14:creationId xmlns:p14="http://schemas.microsoft.com/office/powerpoint/2010/main" val="601809046"/>
+      </p:ext>
+    </p:extLst>
+  </p:cSld>
+  <p:clrMapOvr>
+    <a:masterClrMapping/>
+  </p:clrMapOvr>
+</p:sld>
+</file>
+
+<file path=ppt/slides/slide7.xml><?xml version="1.0" encoding="utf-8"?>
+<p:sld xmlns:a="http://schemas.openxmlformats.org/drawingml/2006/main" xmlns:r="http://schemas.openxmlformats.org/officeDocument/2006/relationships" xmlns:p="http://schemas.openxmlformats.org/presentationml/2006/main">
+  <p:cSld>
+    <p:spTree>
+      <p:nvGrpSpPr>
+        <p:cNvPr id="1" name=""/>
+        <p:cNvGrpSpPr/>
+        <p:nvPr/>
+      </p:nvGrpSpPr>
+      <p:grpSpPr>
+        <a:xfrm>
+          <a:off x="0" y="0"/>
+          <a:ext cx="0" cy="0"/>
+          <a:chOff x="0" y="0"/>
+          <a:chExt cx="0" cy="0"/>
+        </a:xfrm>
+      </p:grpSpPr>
+      <p:sp>
+        <p:nvSpPr>
+          <p:cNvPr id="3" name="Text Placeholder 2">
+            <a:extLst>
+              <a:ext uri="{FF2B5EF4-FFF2-40B4-BE49-F238E27FC236}">
+                <a16:creationId xmlns:a16="http://schemas.microsoft.com/office/drawing/2014/main" id="{99F5DBC8-929E-455F-BA07-52462E7B4FC5}"/>
+              </a:ext>
+            </a:extLst>
+          </p:cNvPr>
+          <p:cNvSpPr>
+            <a:spLocks noGrp="1"/>
+          </p:cNvSpPr>
+          <p:nvPr>
+            <p:ph type="body" sz="quarter" idx="10"/>
+          </p:nvPr>
+        </p:nvSpPr>
+        <p:spPr/>
+        <p:txBody>
+          <a:bodyPr/>
+          <a:lstStyle/>
+          <a:p>
+            <a:r>
+              <a:rPr lang="en-US" dirty="0"/>
+              <a:t>Linux kernel components</a:t>
+            </a:r>
+          </a:p>
+        </p:txBody>
+      </p:sp>
+      <p:pic>
+        <p:nvPicPr>
+          <p:cNvPr id="2" name="Picture 1">
+            <a:extLst>
+              <a:ext uri="{FF2B5EF4-FFF2-40B4-BE49-F238E27FC236}">
+                <a16:creationId xmlns:a16="http://schemas.microsoft.com/office/drawing/2014/main" id="{B91F41E2-B45A-9A4D-8671-089A2268017B}"/>
+              </a:ext>
+            </a:extLst>
+          </p:cNvPr>
+          <p:cNvPicPr>
+            <a:picLocks noChangeAspect="1"/>
+          </p:cNvPicPr>
+          <p:nvPr/>
+        </p:nvPicPr>
+        <p:blipFill>
+          <a:blip r:embed="rId2"/>
+          <a:stretch>
+            <a:fillRect/>
+          </a:stretch>
+        </p:blipFill>
+        <p:spPr>
+          <a:xfrm>
+            <a:off x="1174043" y="1234654"/>
+            <a:ext cx="9049373" cy="5239524"/>
+          </a:xfrm>
+          <a:prstGeom prst="rect">
+            <a:avLst/>
+          </a:prstGeom>
+        </p:spPr>
+      </p:pic>
+    </p:spTree>
+    <p:extLst>
+      <p:ext uri="{BB962C8B-B14F-4D97-AF65-F5344CB8AC3E}">
+        <p14:creationId xmlns:p14="http://schemas.microsoft.com/office/powerpoint/2010/main" val="36617444"/>
+      </p:ext>
+    </p:extLst>
+  </p:cSld>
+  <p:clrMapOvr>
+    <a:masterClrMapping/>
+  </p:clrMapOvr>
+</p:sld>
+</file>
+
+<file path=ppt/slides/slide8.xml><?xml version="1.0" encoding="utf-8"?>
+<p:sld xmlns:a="http://schemas.openxmlformats.org/drawingml/2006/main" xmlns:r="http://schemas.openxmlformats.org/officeDocument/2006/relationships" xmlns:p="http://schemas.openxmlformats.org/presentationml/2006/main">
+  <p:cSld>
+    <p:spTree>
+      <p:nvGrpSpPr>
+        <p:cNvPr id="1" name=""/>
+        <p:cNvGrpSpPr/>
+        <p:nvPr/>
+      </p:nvGrpSpPr>
+      <p:grpSpPr>
+        <a:xfrm>
+          <a:off x="0" y="0"/>
+          <a:ext cx="0" cy="0"/>
+          <a:chOff x="0" y="0"/>
+          <a:chExt cx="0" cy="0"/>
+        </a:xfrm>
+      </p:grpSpPr>
+      <p:sp>
+        <p:nvSpPr>
+          <p:cNvPr id="3" name="Text Placeholder 2">
+            <a:extLst>
+              <a:ext uri="{FF2B5EF4-FFF2-40B4-BE49-F238E27FC236}">
+                <a16:creationId xmlns:a16="http://schemas.microsoft.com/office/drawing/2014/main" id="{99F5DBC8-929E-455F-BA07-52462E7B4FC5}"/>
+              </a:ext>
+            </a:extLst>
+          </p:cNvPr>
+          <p:cNvSpPr>
+            <a:spLocks noGrp="1"/>
+          </p:cNvSpPr>
+          <p:nvPr>
+            <p:ph type="body" sz="quarter" idx="10"/>
+          </p:nvPr>
+        </p:nvSpPr>
+        <p:spPr/>
+        <p:txBody>
+          <a:bodyPr/>
+          <a:lstStyle/>
+          <a:p>
+            <a:r>
+              <a:rPr lang="en-US" dirty="0"/>
+              <a:t>ifconfig, route, netstat</a:t>
+            </a:r>
+          </a:p>
+        </p:txBody>
+      </p:sp>
+      <p:sp>
+        <p:nvSpPr>
+          <p:cNvPr id="4" name="TextBox 3">
+            <a:extLst>
+              <a:ext uri="{FF2B5EF4-FFF2-40B4-BE49-F238E27FC236}">
+                <a16:creationId xmlns:a16="http://schemas.microsoft.com/office/drawing/2014/main" id="{10231B6B-EABC-DF45-A60A-2D926B8A51BD}"/>
+              </a:ext>
+            </a:extLst>
+          </p:cNvPr>
+          <p:cNvSpPr txBox="1"/>
+          <p:nvPr/>
+        </p:nvSpPr>
+        <p:spPr>
+          <a:xfrm>
+            <a:off x="541867" y="1411111"/>
+            <a:ext cx="3679341" cy="923330"/>
+          </a:xfrm>
+          <a:prstGeom prst="rect">
+            <a:avLst/>
+          </a:prstGeom>
+          <a:noFill/>
+        </p:spPr>
+        <p:txBody>
+          <a:bodyPr wrap="none" rtlCol="0">
+            <a:spAutoFit/>
+          </a:bodyPr>
+          <a:lstStyle/>
+          <a:p>
+            <a:r>
+              <a:rPr lang="en-GB" dirty="0">
+                <a:hlinkClick r:id="rId2"/>
+              </a:rPr>
+              <a:t>https://ru.wikipedia.org/wiki/Ifconfig</a:t>
+            </a:r>
+            <a:endParaRPr lang="en-GB" dirty="0"/>
+          </a:p>
+          <a:p>
+            <a:endParaRPr lang="en-GB" dirty="0"/>
+          </a:p>
+          <a:p>
+            <a:endParaRPr lang="en-RU" dirty="0"/>
+          </a:p>
+        </p:txBody>
+      </p:sp>
+    </p:spTree>
+    <p:extLst>
+      <p:ext uri="{BB962C8B-B14F-4D97-AF65-F5344CB8AC3E}">
+        <p14:creationId xmlns:p14="http://schemas.microsoft.com/office/powerpoint/2010/main" val="2122562003"/>
+      </p:ext>
+    </p:extLst>
+  </p:cSld>
+  <p:clrMapOvr>
+    <a:masterClrMapping/>
+  </p:clrMapOvr>
+</p:sld>
+</file>
+
+<file path=ppt/slides/slide9.xml><?xml version="1.0" encoding="utf-8"?>
+<p:sld xmlns:a="http://schemas.openxmlformats.org/drawingml/2006/main" xmlns:r="http://schemas.openxmlformats.org/officeDocument/2006/relationships" xmlns:p="http://schemas.openxmlformats.org/presentationml/2006/main">
+  <p:cSld>
+    <p:spTree>
+      <p:nvGrpSpPr>
+        <p:cNvPr id="1" name=""/>
+        <p:cNvGrpSpPr/>
+        <p:nvPr/>
+      </p:nvGrpSpPr>
+      <p:grpSpPr>
+        <a:xfrm>
+          <a:off x="0" y="0"/>
+          <a:ext cx="0" cy="0"/>
+          <a:chOff x="0" y="0"/>
+          <a:chExt cx="0" cy="0"/>
+        </a:xfrm>
+      </p:grpSpPr>
+      <p:sp>
+        <p:nvSpPr>
+          <p:cNvPr id="3" name="Text Placeholder 2">
+            <a:extLst>
+              <a:ext uri="{FF2B5EF4-FFF2-40B4-BE49-F238E27FC236}">
+                <a16:creationId xmlns:a16="http://schemas.microsoft.com/office/drawing/2014/main" id="{99F5DBC8-929E-455F-BA07-52462E7B4FC5}"/>
+              </a:ext>
+            </a:extLst>
+          </p:cNvPr>
+          <p:cNvSpPr>
+            <a:spLocks noGrp="1"/>
+          </p:cNvSpPr>
+          <p:nvPr>
+            <p:ph type="body" sz="quarter" idx="10"/>
+          </p:nvPr>
+        </p:nvSpPr>
+        <p:spPr/>
+        <p:txBody>
+          <a:bodyPr/>
+          <a:lstStyle/>
+          <a:p>
+            <a:r>
+              <a:rPr lang="en-US" dirty="0" err="1"/>
+              <a:t>ip</a:t>
+            </a:r>
+            <a:r>
+              <a:rPr lang="en-US" dirty="0"/>
+              <a:t> route 2</a:t>
+            </a:r>
+          </a:p>
+        </p:txBody>
+      </p:sp>
+      <p:pic>
+        <p:nvPicPr>
+          <p:cNvPr id="4" name="Picture 3">
+            <a:extLst>
+              <a:ext uri="{FF2B5EF4-FFF2-40B4-BE49-F238E27FC236}">
+                <a16:creationId xmlns:a16="http://schemas.microsoft.com/office/drawing/2014/main" id="{A4A00E0A-2603-804C-9DC2-348CBFD4DF39}"/>
+              </a:ext>
+            </a:extLst>
+          </p:cNvPr>
+          <p:cNvPicPr>
+            <a:picLocks noChangeAspect="1"/>
+          </p:cNvPicPr>
+          <p:nvPr/>
+        </p:nvPicPr>
+        <p:blipFill>
+          <a:blip r:embed="rId2"/>
+          <a:stretch>
+            <a:fillRect/>
+          </a:stretch>
+        </p:blipFill>
+        <p:spPr>
+          <a:xfrm>
+            <a:off x="3886200" y="177800"/>
+            <a:ext cx="4419600" cy="6502400"/>
+          </a:xfrm>
+          <a:prstGeom prst="rect">
+            <a:avLst/>
+          </a:prstGeom>
+        </p:spPr>
+      </p:pic>
+    </p:spTree>
+    <p:extLst>
+      <p:ext uri="{BB962C8B-B14F-4D97-AF65-F5344CB8AC3E}">
+        <p14:creationId xmlns:p14="http://schemas.microsoft.com/office/powerpoint/2010/main" val="3178011263"/>
       </p:ext>
     </p:extLst>
   </p:cSld>

</xml_diff>